<commit_message>
Update to grapheditor introduction+change of e-mail
</commit_message>
<xml_diff>
--- a/EUConnect18/doc/GraphEditor introduction.pptx
+++ b/EUConnect18/doc/GraphEditor introduction.pptx
@@ -4,6 +4,9 @@
   <p:sldMasterIdLst>
     <p:sldMasterId id="2147483648" r:id="rId1"/>
   </p:sldMasterIdLst>
+  <p:notesMasterIdLst>
+    <p:notesMasterId r:id="rId13"/>
+  </p:notesMasterIdLst>
   <p:sldIdLst>
     <p:sldId id="256" r:id="rId2"/>
     <p:sldId id="263" r:id="rId3"/>
@@ -122,6 +125,437 @@
 </p:presentation>
 </file>
 
+<file path=ppt/notesMasters/notesMaster1.xml><?xml version="1.0" encoding="utf-8"?>
+<p:notesMaster xmlns:a="http://schemas.openxmlformats.org/drawingml/2006/main" xmlns:r="http://schemas.openxmlformats.org/officeDocument/2006/relationships" xmlns:p="http://schemas.openxmlformats.org/presentationml/2006/main">
+  <p:cSld>
+    <p:bg>
+      <p:bgRef idx="1001">
+        <a:schemeClr val="bg1"/>
+      </p:bgRef>
+    </p:bg>
+    <p:spTree>
+      <p:nvGrpSpPr>
+        <p:cNvPr id="1" name=""/>
+        <p:cNvGrpSpPr/>
+        <p:nvPr/>
+      </p:nvGrpSpPr>
+      <p:grpSpPr>
+        <a:xfrm>
+          <a:off x="0" y="0"/>
+          <a:ext cx="0" cy="0"/>
+          <a:chOff x="0" y="0"/>
+          <a:chExt cx="0" cy="0"/>
+        </a:xfrm>
+      </p:grpSpPr>
+      <p:sp>
+        <p:nvSpPr>
+          <p:cNvPr id="2" name="Header Placeholder 1"/>
+          <p:cNvSpPr>
+            <a:spLocks noGrp="1"/>
+          </p:cNvSpPr>
+          <p:nvPr>
+            <p:ph type="hdr" sz="quarter"/>
+          </p:nvPr>
+        </p:nvSpPr>
+        <p:spPr>
+          <a:xfrm>
+            <a:off x="0" y="0"/>
+            <a:ext cx="2971800" cy="458788"/>
+          </a:xfrm>
+          <a:prstGeom prst="rect">
+            <a:avLst/>
+          </a:prstGeom>
+        </p:spPr>
+        <p:txBody>
+          <a:bodyPr vert="horz" lIns="91440" tIns="45720" rIns="91440" bIns="45720" rtlCol="0"/>
+          <a:lstStyle>
+            <a:lvl1pPr algn="l">
+              <a:defRPr sz="1200"/>
+            </a:lvl1pPr>
+          </a:lstStyle>
+          <a:p>
+            <a:endParaRPr lang="sv-SE"/>
+          </a:p>
+        </p:txBody>
+      </p:sp>
+      <p:sp>
+        <p:nvSpPr>
+          <p:cNvPr id="3" name="Date Placeholder 2"/>
+          <p:cNvSpPr>
+            <a:spLocks noGrp="1"/>
+          </p:cNvSpPr>
+          <p:nvPr>
+            <p:ph type="dt" idx="1"/>
+          </p:nvPr>
+        </p:nvSpPr>
+        <p:spPr>
+          <a:xfrm>
+            <a:off x="3884613" y="0"/>
+            <a:ext cx="2971800" cy="458788"/>
+          </a:xfrm>
+          <a:prstGeom prst="rect">
+            <a:avLst/>
+          </a:prstGeom>
+        </p:spPr>
+        <p:txBody>
+          <a:bodyPr vert="horz" lIns="91440" tIns="45720" rIns="91440" bIns="45720" rtlCol="0"/>
+          <a:lstStyle>
+            <a:lvl1pPr algn="r">
+              <a:defRPr sz="1200"/>
+            </a:lvl1pPr>
+          </a:lstStyle>
+          <a:p>
+            <a:fld id="{EA99ECBD-0207-3547-9A52-51BCCF8FC753}" type="datetimeFigureOut">
+              <a:t>2018-10-18</a:t>
+            </a:fld>
+            <a:endParaRPr lang="sv-SE"/>
+          </a:p>
+        </p:txBody>
+      </p:sp>
+      <p:sp>
+        <p:nvSpPr>
+          <p:cNvPr id="4" name="Slide Image Placeholder 3"/>
+          <p:cNvSpPr>
+            <a:spLocks noGrp="1" noRot="1" noChangeAspect="1"/>
+          </p:cNvSpPr>
+          <p:nvPr>
+            <p:ph type="sldImg" idx="2"/>
+          </p:nvPr>
+        </p:nvSpPr>
+        <p:spPr>
+          <a:xfrm>
+            <a:off x="685800" y="1143000"/>
+            <a:ext cx="5486400" cy="3086100"/>
+          </a:xfrm>
+          <a:prstGeom prst="rect">
+            <a:avLst/>
+          </a:prstGeom>
+          <a:noFill/>
+          <a:ln w="12700">
+            <a:solidFill>
+              <a:prstClr val="black"/>
+            </a:solidFill>
+          </a:ln>
+        </p:spPr>
+        <p:txBody>
+          <a:bodyPr vert="horz" lIns="91440" tIns="45720" rIns="91440" bIns="45720" rtlCol="0" anchor="ctr"/>
+          <a:lstStyle/>
+          <a:p>
+            <a:endParaRPr lang="sv-SE"/>
+          </a:p>
+        </p:txBody>
+      </p:sp>
+      <p:sp>
+        <p:nvSpPr>
+          <p:cNvPr id="5" name="Notes Placeholder 4"/>
+          <p:cNvSpPr>
+            <a:spLocks noGrp="1"/>
+          </p:cNvSpPr>
+          <p:nvPr>
+            <p:ph type="body" sz="quarter" idx="3"/>
+          </p:nvPr>
+        </p:nvSpPr>
+        <p:spPr>
+          <a:xfrm>
+            <a:off x="685800" y="4400550"/>
+            <a:ext cx="5486400" cy="3600450"/>
+          </a:xfrm>
+          <a:prstGeom prst="rect">
+            <a:avLst/>
+          </a:prstGeom>
+        </p:spPr>
+        <p:txBody>
+          <a:bodyPr vert="horz" lIns="91440" tIns="45720" rIns="91440" bIns="45720" rtlCol="0"/>
+          <a:lstStyle/>
+          <a:p>
+            <a:pPr lvl="0"/>
+            <a:r>
+              <a:rPr lang="en-US"/>
+              <a:t>Edit Master text styles</a:t>
+            </a:r>
+          </a:p>
+          <a:p>
+            <a:pPr lvl="1"/>
+            <a:r>
+              <a:rPr lang="en-US"/>
+              <a:t>Second level</a:t>
+            </a:r>
+          </a:p>
+          <a:p>
+            <a:pPr lvl="2"/>
+            <a:r>
+              <a:rPr lang="en-US"/>
+              <a:t>Third level</a:t>
+            </a:r>
+          </a:p>
+          <a:p>
+            <a:pPr lvl="3"/>
+            <a:r>
+              <a:rPr lang="en-US"/>
+              <a:t>Fourth level</a:t>
+            </a:r>
+          </a:p>
+          <a:p>
+            <a:pPr lvl="4"/>
+            <a:r>
+              <a:rPr lang="en-US"/>
+              <a:t>Fifth level</a:t>
+            </a:r>
+            <a:endParaRPr lang="sv-SE"/>
+          </a:p>
+        </p:txBody>
+      </p:sp>
+      <p:sp>
+        <p:nvSpPr>
+          <p:cNvPr id="6" name="Footer Placeholder 5"/>
+          <p:cNvSpPr>
+            <a:spLocks noGrp="1"/>
+          </p:cNvSpPr>
+          <p:nvPr>
+            <p:ph type="ftr" sz="quarter" idx="4"/>
+          </p:nvPr>
+        </p:nvSpPr>
+        <p:spPr>
+          <a:xfrm>
+            <a:off x="0" y="8685213"/>
+            <a:ext cx="2971800" cy="458787"/>
+          </a:xfrm>
+          <a:prstGeom prst="rect">
+            <a:avLst/>
+          </a:prstGeom>
+        </p:spPr>
+        <p:txBody>
+          <a:bodyPr vert="horz" lIns="91440" tIns="45720" rIns="91440" bIns="45720" rtlCol="0" anchor="b"/>
+          <a:lstStyle>
+            <a:lvl1pPr algn="l">
+              <a:defRPr sz="1200"/>
+            </a:lvl1pPr>
+          </a:lstStyle>
+          <a:p>
+            <a:endParaRPr lang="sv-SE"/>
+          </a:p>
+        </p:txBody>
+      </p:sp>
+      <p:sp>
+        <p:nvSpPr>
+          <p:cNvPr id="7" name="Slide Number Placeholder 6"/>
+          <p:cNvSpPr>
+            <a:spLocks noGrp="1"/>
+          </p:cNvSpPr>
+          <p:nvPr>
+            <p:ph type="sldNum" sz="quarter" idx="5"/>
+          </p:nvPr>
+        </p:nvSpPr>
+        <p:spPr>
+          <a:xfrm>
+            <a:off x="3884613" y="8685213"/>
+            <a:ext cx="2971800" cy="458787"/>
+          </a:xfrm>
+          <a:prstGeom prst="rect">
+            <a:avLst/>
+          </a:prstGeom>
+        </p:spPr>
+        <p:txBody>
+          <a:bodyPr vert="horz" lIns="91440" tIns="45720" rIns="91440" bIns="45720" rtlCol="0" anchor="b"/>
+          <a:lstStyle>
+            <a:lvl1pPr algn="r">
+              <a:defRPr sz="1200"/>
+            </a:lvl1pPr>
+          </a:lstStyle>
+          <a:p>
+            <a:fld id="{8A8B3B9A-EACA-834F-8E2E-A952EFFC2EA9}" type="slidenum">
+              <a:t>‹#›</a:t>
+            </a:fld>
+            <a:endParaRPr lang="sv-SE"/>
+          </a:p>
+        </p:txBody>
+      </p:sp>
+    </p:spTree>
+    <p:extLst>
+      <p:ext uri="{BB962C8B-B14F-4D97-AF65-F5344CB8AC3E}">
+        <p14:creationId xmlns:p14="http://schemas.microsoft.com/office/powerpoint/2010/main" val="492979821"/>
+      </p:ext>
+    </p:extLst>
+  </p:cSld>
+  <p:clrMap bg1="lt1" tx1="dk1" bg2="lt2" tx2="dk2" accent1="accent1" accent2="accent2" accent3="accent3" accent4="accent4" accent5="accent5" accent6="accent6" hlink="hlink" folHlink="folHlink"/>
+  <p:notesStyle>
+    <a:lvl1pPr marL="0" algn="l" defTabSz="914400" rtl="0" eaLnBrk="1" latinLnBrk="0" hangingPunct="1">
+      <a:defRPr sz="1200" kern="1200">
+        <a:solidFill>
+          <a:schemeClr val="tx1"/>
+        </a:solidFill>
+        <a:latin typeface="+mn-lt"/>
+        <a:ea typeface="+mn-ea"/>
+        <a:cs typeface="+mn-cs"/>
+      </a:defRPr>
+    </a:lvl1pPr>
+    <a:lvl2pPr marL="457200" algn="l" defTabSz="914400" rtl="0" eaLnBrk="1" latinLnBrk="0" hangingPunct="1">
+      <a:defRPr sz="1200" kern="1200">
+        <a:solidFill>
+          <a:schemeClr val="tx1"/>
+        </a:solidFill>
+        <a:latin typeface="+mn-lt"/>
+        <a:ea typeface="+mn-ea"/>
+        <a:cs typeface="+mn-cs"/>
+      </a:defRPr>
+    </a:lvl2pPr>
+    <a:lvl3pPr marL="914400" algn="l" defTabSz="914400" rtl="0" eaLnBrk="1" latinLnBrk="0" hangingPunct="1">
+      <a:defRPr sz="1200" kern="1200">
+        <a:solidFill>
+          <a:schemeClr val="tx1"/>
+        </a:solidFill>
+        <a:latin typeface="+mn-lt"/>
+        <a:ea typeface="+mn-ea"/>
+        <a:cs typeface="+mn-cs"/>
+      </a:defRPr>
+    </a:lvl3pPr>
+    <a:lvl4pPr marL="1371600" algn="l" defTabSz="914400" rtl="0" eaLnBrk="1" latinLnBrk="0" hangingPunct="1">
+      <a:defRPr sz="1200" kern="1200">
+        <a:solidFill>
+          <a:schemeClr val="tx1"/>
+        </a:solidFill>
+        <a:latin typeface="+mn-lt"/>
+        <a:ea typeface="+mn-ea"/>
+        <a:cs typeface="+mn-cs"/>
+      </a:defRPr>
+    </a:lvl4pPr>
+    <a:lvl5pPr marL="1828800" algn="l" defTabSz="914400" rtl="0" eaLnBrk="1" latinLnBrk="0" hangingPunct="1">
+      <a:defRPr sz="1200" kern="1200">
+        <a:solidFill>
+          <a:schemeClr val="tx1"/>
+        </a:solidFill>
+        <a:latin typeface="+mn-lt"/>
+        <a:ea typeface="+mn-ea"/>
+        <a:cs typeface="+mn-cs"/>
+      </a:defRPr>
+    </a:lvl5pPr>
+    <a:lvl6pPr marL="2286000" algn="l" defTabSz="914400" rtl="0" eaLnBrk="1" latinLnBrk="0" hangingPunct="1">
+      <a:defRPr sz="1200" kern="1200">
+        <a:solidFill>
+          <a:schemeClr val="tx1"/>
+        </a:solidFill>
+        <a:latin typeface="+mn-lt"/>
+        <a:ea typeface="+mn-ea"/>
+        <a:cs typeface="+mn-cs"/>
+      </a:defRPr>
+    </a:lvl6pPr>
+    <a:lvl7pPr marL="2743200" algn="l" defTabSz="914400" rtl="0" eaLnBrk="1" latinLnBrk="0" hangingPunct="1">
+      <a:defRPr sz="1200" kern="1200">
+        <a:solidFill>
+          <a:schemeClr val="tx1"/>
+        </a:solidFill>
+        <a:latin typeface="+mn-lt"/>
+        <a:ea typeface="+mn-ea"/>
+        <a:cs typeface="+mn-cs"/>
+      </a:defRPr>
+    </a:lvl7pPr>
+    <a:lvl8pPr marL="3200400" algn="l" defTabSz="914400" rtl="0" eaLnBrk="1" latinLnBrk="0" hangingPunct="1">
+      <a:defRPr sz="1200" kern="1200">
+        <a:solidFill>
+          <a:schemeClr val="tx1"/>
+        </a:solidFill>
+        <a:latin typeface="+mn-lt"/>
+        <a:ea typeface="+mn-ea"/>
+        <a:cs typeface="+mn-cs"/>
+      </a:defRPr>
+    </a:lvl8pPr>
+    <a:lvl9pPr marL="3657600" algn="l" defTabSz="914400" rtl="0" eaLnBrk="1" latinLnBrk="0" hangingPunct="1">
+      <a:defRPr sz="1200" kern="1200">
+        <a:solidFill>
+          <a:schemeClr val="tx1"/>
+        </a:solidFill>
+        <a:latin typeface="+mn-lt"/>
+        <a:ea typeface="+mn-ea"/>
+        <a:cs typeface="+mn-cs"/>
+      </a:defRPr>
+    </a:lvl9pPr>
+  </p:notesStyle>
+</p:notesMaster>
+</file>
+
+<file path=ppt/notesSlides/notesSlide1.xml><?xml version="1.0" encoding="utf-8"?>
+<p:notes xmlns:a="http://schemas.openxmlformats.org/drawingml/2006/main" xmlns:r="http://schemas.openxmlformats.org/officeDocument/2006/relationships" xmlns:p="http://schemas.openxmlformats.org/presentationml/2006/main">
+  <p:cSld>
+    <p:spTree>
+      <p:nvGrpSpPr>
+        <p:cNvPr id="1" name=""/>
+        <p:cNvGrpSpPr/>
+        <p:nvPr/>
+      </p:nvGrpSpPr>
+      <p:grpSpPr>
+        <a:xfrm>
+          <a:off x="0" y="0"/>
+          <a:ext cx="0" cy="0"/>
+          <a:chOff x="0" y="0"/>
+          <a:chExt cx="0" cy="0"/>
+        </a:xfrm>
+      </p:grpSpPr>
+      <p:sp>
+        <p:nvSpPr>
+          <p:cNvPr id="2" name="Slide Image Placeholder 1"/>
+          <p:cNvSpPr>
+            <a:spLocks noGrp="1" noRot="1" noChangeAspect="1"/>
+          </p:cNvSpPr>
+          <p:nvPr>
+            <p:ph type="sldImg"/>
+          </p:nvPr>
+        </p:nvSpPr>
+        <p:spPr/>
+      </p:sp>
+      <p:sp>
+        <p:nvSpPr>
+          <p:cNvPr id="3" name="Notes Placeholder 2"/>
+          <p:cNvSpPr>
+            <a:spLocks noGrp="1"/>
+          </p:cNvSpPr>
+          <p:nvPr>
+            <p:ph type="body" idx="1"/>
+          </p:nvPr>
+        </p:nvSpPr>
+        <p:spPr/>
+        <p:txBody>
+          <a:bodyPr/>
+          <a:lstStyle/>
+          <a:p>
+            <a:endParaRPr lang="sv-SE"/>
+          </a:p>
+        </p:txBody>
+      </p:sp>
+      <p:sp>
+        <p:nvSpPr>
+          <p:cNvPr id="4" name="Slide Number Placeholder 3"/>
+          <p:cNvSpPr>
+            <a:spLocks noGrp="1"/>
+          </p:cNvSpPr>
+          <p:nvPr>
+            <p:ph type="sldNum" sz="quarter" idx="5"/>
+          </p:nvPr>
+        </p:nvSpPr>
+        <p:spPr/>
+        <p:txBody>
+          <a:bodyPr/>
+          <a:lstStyle/>
+          <a:p>
+            <a:fld id="{8A8B3B9A-EACA-834F-8E2E-A952EFFC2EA9}" type="slidenum">
+              <a:t>2</a:t>
+            </a:fld>
+            <a:endParaRPr lang="sv-SE"/>
+          </a:p>
+        </p:txBody>
+      </p:sp>
+    </p:spTree>
+    <p:extLst>
+      <p:ext uri="{BB962C8B-B14F-4D97-AF65-F5344CB8AC3E}">
+        <p14:creationId xmlns:p14="http://schemas.microsoft.com/office/powerpoint/2010/main" val="3593782767"/>
+      </p:ext>
+    </p:extLst>
+  </p:cSld>
+  <p:clrMapOvr>
+    <a:masterClrMapping/>
+  </p:clrMapOvr>
+</p:notes>
+</file>
+
 <file path=ppt/slideLayouts/slideLayout1.xml><?xml version="1.0" encoding="utf-8"?>
 <p:sldLayout xmlns:a="http://schemas.openxmlformats.org/drawingml/2006/main" xmlns:r="http://schemas.openxmlformats.org/officeDocument/2006/relationships" xmlns:p="http://schemas.openxmlformats.org/presentationml/2006/main" type="title" preserve="1">
   <p:cSld name="Title Slide">
@@ -271,7 +705,7 @@
           <a:p>
             <a:fld id="{B7C88195-5F19-4398-AC35-0F647D46A257}" type="datetimeFigureOut">
               <a:rPr lang="sv-SE" smtClean="0"/>
-              <a:t>2018-02-20</a:t>
+              <a:t>2018-10-18</a:t>
             </a:fld>
             <a:endParaRPr lang="sv-SE"/>
           </a:p>
@@ -471,7 +905,7 @@
           <a:p>
             <a:fld id="{B7C88195-5F19-4398-AC35-0F647D46A257}" type="datetimeFigureOut">
               <a:rPr lang="sv-SE" smtClean="0"/>
-              <a:t>2018-02-20</a:t>
+              <a:t>2018-10-18</a:t>
             </a:fld>
             <a:endParaRPr lang="sv-SE"/>
           </a:p>
@@ -681,7 +1115,7 @@
           <a:p>
             <a:fld id="{B7C88195-5F19-4398-AC35-0F647D46A257}" type="datetimeFigureOut">
               <a:rPr lang="sv-SE" smtClean="0"/>
-              <a:t>2018-02-20</a:t>
+              <a:t>2018-10-18</a:t>
             </a:fld>
             <a:endParaRPr lang="sv-SE"/>
           </a:p>
@@ -881,7 +1315,7 @@
           <a:p>
             <a:fld id="{B7C88195-5F19-4398-AC35-0F647D46A257}" type="datetimeFigureOut">
               <a:rPr lang="sv-SE" smtClean="0"/>
-              <a:t>2018-02-20</a:t>
+              <a:t>2018-10-18</a:t>
             </a:fld>
             <a:endParaRPr lang="sv-SE"/>
           </a:p>
@@ -1157,7 +1591,7 @@
           <a:p>
             <a:fld id="{B7C88195-5F19-4398-AC35-0F647D46A257}" type="datetimeFigureOut">
               <a:rPr lang="sv-SE" smtClean="0"/>
-              <a:t>2018-02-20</a:t>
+              <a:t>2018-10-18</a:t>
             </a:fld>
             <a:endParaRPr lang="sv-SE"/>
           </a:p>
@@ -1425,7 +1859,7 @@
           <a:p>
             <a:fld id="{B7C88195-5F19-4398-AC35-0F647D46A257}" type="datetimeFigureOut">
               <a:rPr lang="sv-SE" smtClean="0"/>
-              <a:t>2018-02-20</a:t>
+              <a:t>2018-10-18</a:t>
             </a:fld>
             <a:endParaRPr lang="sv-SE"/>
           </a:p>
@@ -1840,7 +2274,7 @@
           <a:p>
             <a:fld id="{B7C88195-5F19-4398-AC35-0F647D46A257}" type="datetimeFigureOut">
               <a:rPr lang="sv-SE" smtClean="0"/>
-              <a:t>2018-02-20</a:t>
+              <a:t>2018-10-18</a:t>
             </a:fld>
             <a:endParaRPr lang="sv-SE"/>
           </a:p>
@@ -1982,7 +2416,7 @@
           <a:p>
             <a:fld id="{B7C88195-5F19-4398-AC35-0F647D46A257}" type="datetimeFigureOut">
               <a:rPr lang="sv-SE" smtClean="0"/>
-              <a:t>2018-02-20</a:t>
+              <a:t>2018-10-18</a:t>
             </a:fld>
             <a:endParaRPr lang="sv-SE"/>
           </a:p>
@@ -2095,7 +2529,7 @@
           <a:p>
             <a:fld id="{B7C88195-5F19-4398-AC35-0F647D46A257}" type="datetimeFigureOut">
               <a:rPr lang="sv-SE" smtClean="0"/>
-              <a:t>2018-02-20</a:t>
+              <a:t>2018-10-18</a:t>
             </a:fld>
             <a:endParaRPr lang="sv-SE"/>
           </a:p>
@@ -2408,7 +2842,7 @@
           <a:p>
             <a:fld id="{B7C88195-5F19-4398-AC35-0F647D46A257}" type="datetimeFigureOut">
               <a:rPr lang="sv-SE" smtClean="0"/>
-              <a:t>2018-02-20</a:t>
+              <a:t>2018-10-18</a:t>
             </a:fld>
             <a:endParaRPr lang="sv-SE"/>
           </a:p>
@@ -2697,7 +3131,7 @@
           <a:p>
             <a:fld id="{B7C88195-5F19-4398-AC35-0F647D46A257}" type="datetimeFigureOut">
               <a:rPr lang="sv-SE" smtClean="0"/>
-              <a:t>2018-02-20</a:t>
+              <a:t>2018-10-18</a:t>
             </a:fld>
             <a:endParaRPr lang="sv-SE"/>
           </a:p>
@@ -2940,7 +3374,7 @@
           <a:p>
             <a:fld id="{B7C88195-5F19-4398-AC35-0F647D46A257}" type="datetimeFigureOut">
               <a:rPr lang="sv-SE" smtClean="0"/>
-              <a:t>2018-02-20</a:t>
+              <a:t>2018-10-18</a:t>
             </a:fld>
             <a:endParaRPr lang="sv-SE"/>
           </a:p>
@@ -3408,7 +3842,7 @@
           <a:p>
             <a:r>
               <a:rPr lang="sv-SE" dirty="0"/>
-              <a:t>Phuse CSS March 2018</a:t>
+              <a:t>Phuse EU Connect 2018</a:t>
             </a:r>
           </a:p>
         </p:txBody>
@@ -3701,10 +4135,10 @@
       </p:pic>
       <p:pic>
         <p:nvPicPr>
-          <p:cNvPr id="6" name="Picture 5">
-            <a:extLst>
-              <a:ext uri="{FF2B5EF4-FFF2-40B4-BE49-F238E27FC236}">
-                <a16:creationId xmlns:a16="http://schemas.microsoft.com/office/drawing/2014/main" id="{5FC0457B-1BE7-45ED-8BB0-6BA7B688662D}"/>
+          <p:cNvPr id="8" name="Picture 7">
+            <a:extLst>
+              <a:ext uri="{FF2B5EF4-FFF2-40B4-BE49-F238E27FC236}">
+                <a16:creationId xmlns:a16="http://schemas.microsoft.com/office/drawing/2014/main" id="{DE1C08A9-D1DF-4FDC-9551-05577137BA11}"/>
               </a:ext>
             </a:extLst>
           </p:cNvPr>
@@ -3721,8 +4155,8 @@
         </p:blipFill>
         <p:spPr>
           <a:xfrm>
-            <a:off x="5009049" y="4885985"/>
-            <a:ext cx="1495425" cy="1104900"/>
+            <a:off x="7729537" y="2239837"/>
+            <a:ext cx="2867025" cy="1114425"/>
           </a:xfrm>
           <a:prstGeom prst="rect">
             <a:avLst/>
@@ -3736,10 +4170,10 @@
       </p:pic>
       <p:pic>
         <p:nvPicPr>
-          <p:cNvPr id="8" name="Picture 7">
-            <a:extLst>
-              <a:ext uri="{FF2B5EF4-FFF2-40B4-BE49-F238E27FC236}">
-                <a16:creationId xmlns:a16="http://schemas.microsoft.com/office/drawing/2014/main" id="{DE1C08A9-D1DF-4FDC-9551-05577137BA11}"/>
+          <p:cNvPr id="11" name="Picture 10">
+            <a:extLst>
+              <a:ext uri="{FF2B5EF4-FFF2-40B4-BE49-F238E27FC236}">
+                <a16:creationId xmlns:a16="http://schemas.microsoft.com/office/drawing/2014/main" id="{509B8BDA-0AC0-42C8-ACE1-35E2445DC026}"/>
               </a:ext>
             </a:extLst>
           </p:cNvPr>
@@ -3756,7 +4190,7 @@
         </p:blipFill>
         <p:spPr>
           <a:xfrm>
-            <a:off x="7729537" y="2239837"/>
+            <a:off x="1202712" y="2270062"/>
             <a:ext cx="2867025" cy="1114425"/>
           </a:xfrm>
           <a:prstGeom prst="rect">
@@ -3771,10 +4205,10 @@
       </p:pic>
       <p:pic>
         <p:nvPicPr>
-          <p:cNvPr id="11" name="Picture 10">
-            <a:extLst>
-              <a:ext uri="{FF2B5EF4-FFF2-40B4-BE49-F238E27FC236}">
-                <a16:creationId xmlns:a16="http://schemas.microsoft.com/office/drawing/2014/main" id="{509B8BDA-0AC0-42C8-ACE1-35E2445DC026}"/>
+          <p:cNvPr id="3" name="Picture 2">
+            <a:extLst>
+              <a:ext uri="{FF2B5EF4-FFF2-40B4-BE49-F238E27FC236}">
+                <a16:creationId xmlns:a16="http://schemas.microsoft.com/office/drawing/2014/main" id="{B0571E0A-352E-C845-9B92-9F4F027E5EBE}"/>
               </a:ext>
             </a:extLst>
           </p:cNvPr>
@@ -3791,8 +4225,8 @@
         </p:blipFill>
         <p:spPr>
           <a:xfrm>
-            <a:off x="1202712" y="2270062"/>
-            <a:ext cx="2867025" cy="1114425"/>
+            <a:off x="4936207" y="4868501"/>
+            <a:ext cx="2319586" cy="1039091"/>
           </a:xfrm>
           <a:prstGeom prst="rect">
             <a:avLst/>
@@ -4372,7 +4806,7 @@
           <p:nvPr/>
         </p:nvPicPr>
         <p:blipFill>
-          <a:blip r:embed="rId2"/>
+          <a:blip r:embed="rId3"/>
           <a:stretch>
             <a:fillRect/>
           </a:stretch>
@@ -4380,7 +4814,7 @@
         <p:spPr>
           <a:xfrm>
             <a:off x="1794028" y="1283833"/>
-            <a:ext cx="8018347" cy="5304571"/>
+            <a:ext cx="8015670" cy="5302800"/>
           </a:xfrm>
           <a:prstGeom prst="rect">
             <a:avLst/>
@@ -4390,6 +4824,36 @@
               <a:schemeClr val="tx1"/>
             </a:solidFill>
           </a:ln>
+        </p:spPr>
+      </p:pic>
+      <p:pic>
+        <p:nvPicPr>
+          <p:cNvPr id="5" name="Picture 4">
+            <a:extLst>
+              <a:ext uri="{FF2B5EF4-FFF2-40B4-BE49-F238E27FC236}">
+                <a16:creationId xmlns:a16="http://schemas.microsoft.com/office/drawing/2014/main" id="{0077FD01-AA01-E541-9CA3-E438EBE507B1}"/>
+              </a:ext>
+            </a:extLst>
+          </p:cNvPr>
+          <p:cNvPicPr>
+            <a:picLocks noChangeAspect="1"/>
+          </p:cNvPicPr>
+          <p:nvPr/>
+        </p:nvPicPr>
+        <p:blipFill>
+          <a:blip r:embed="rId4"/>
+          <a:stretch>
+            <a:fillRect/>
+          </a:stretch>
+        </p:blipFill>
+        <p:spPr>
+          <a:xfrm>
+            <a:off x="1908622" y="3676192"/>
+            <a:ext cx="5865397" cy="2196265"/>
+          </a:xfrm>
+          <a:prstGeom prst="rect">
+            <a:avLst/>
+          </a:prstGeom>
         </p:spPr>
       </p:pic>
     </p:spTree>
@@ -4901,6 +5365,48 @@
           </a:p>
         </p:txBody>
       </p:sp>
+      <p:pic>
+        <p:nvPicPr>
+          <p:cNvPr id="15" name="Picture 14">
+            <a:extLst>
+              <a:ext uri="{FF2B5EF4-FFF2-40B4-BE49-F238E27FC236}">
+                <a16:creationId xmlns:a16="http://schemas.microsoft.com/office/drawing/2014/main" id="{918E8435-4169-9945-9820-2EC7A8B48E53}"/>
+              </a:ext>
+            </a:extLst>
+          </p:cNvPr>
+          <p:cNvPicPr>
+            <a:picLocks noChangeAspect="1"/>
+          </p:cNvPicPr>
+          <p:nvPr/>
+        </p:nvPicPr>
+        <p:blipFill>
+          <a:blip r:embed="rId4">
+            <a:extLst>
+              <a:ext uri="{BEBA8EAE-BF5A-486C-A8C5-ECC9F3942E4B}">
+                <a14:imgProps xmlns:a14="http://schemas.microsoft.com/office/drawing/2010/main">
+                  <a14:imgLayer>
+                    <a14:imgEffect>
+                      <a14:sharpenSoften amount="-50000"/>
+                    </a14:imgEffect>
+                  </a14:imgLayer>
+                </a14:imgProps>
+              </a:ext>
+            </a:extLst>
+          </a:blip>
+          <a:stretch>
+            <a:fillRect/>
+          </a:stretch>
+        </p:blipFill>
+        <p:spPr>
+          <a:xfrm>
+            <a:off x="1908622" y="3676192"/>
+            <a:ext cx="5865397" cy="2196265"/>
+          </a:xfrm>
+          <a:prstGeom prst="rect">
+            <a:avLst/>
+          </a:prstGeom>
+        </p:spPr>
+      </p:pic>
     </p:spTree>
     <p:extLst>
       <p:ext uri="{BB962C8B-B14F-4D97-AF65-F5344CB8AC3E}">
@@ -5638,6 +6144,66 @@
           </a:p>
         </p:txBody>
       </p:sp>
+      <p:pic>
+        <p:nvPicPr>
+          <p:cNvPr id="12" name="Picture 11">
+            <a:extLst>
+              <a:ext uri="{FF2B5EF4-FFF2-40B4-BE49-F238E27FC236}">
+                <a16:creationId xmlns:a16="http://schemas.microsoft.com/office/drawing/2014/main" id="{D8D41F39-981A-DD45-BB24-7887E16F7FCE}"/>
+              </a:ext>
+            </a:extLst>
+          </p:cNvPr>
+          <p:cNvPicPr>
+            <a:picLocks noChangeAspect="1"/>
+          </p:cNvPicPr>
+          <p:nvPr/>
+        </p:nvPicPr>
+        <p:blipFill>
+          <a:blip r:embed="rId5"/>
+          <a:stretch>
+            <a:fillRect/>
+          </a:stretch>
+        </p:blipFill>
+        <p:spPr>
+          <a:xfrm>
+            <a:off x="541951" y="3851687"/>
+            <a:ext cx="4006145" cy="1500078"/>
+          </a:xfrm>
+          <a:prstGeom prst="rect">
+            <a:avLst/>
+          </a:prstGeom>
+        </p:spPr>
+      </p:pic>
+      <p:pic>
+        <p:nvPicPr>
+          <p:cNvPr id="14" name="Picture 13">
+            <a:extLst>
+              <a:ext uri="{FF2B5EF4-FFF2-40B4-BE49-F238E27FC236}">
+                <a16:creationId xmlns:a16="http://schemas.microsoft.com/office/drawing/2014/main" id="{1E4A1D06-4FA0-6646-8209-0BFD965D871C}"/>
+              </a:ext>
+            </a:extLst>
+          </p:cNvPr>
+          <p:cNvPicPr>
+            <a:picLocks noChangeAspect="1"/>
+          </p:cNvPicPr>
+          <p:nvPr/>
+        </p:nvPicPr>
+        <p:blipFill>
+          <a:blip r:embed="rId5"/>
+          <a:stretch>
+            <a:fillRect/>
+          </a:stretch>
+        </p:blipFill>
+        <p:spPr>
+          <a:xfrm>
+            <a:off x="6587600" y="3851687"/>
+            <a:ext cx="4006145" cy="1500078"/>
+          </a:xfrm>
+          <a:prstGeom prst="rect">
+            <a:avLst/>
+          </a:prstGeom>
+        </p:spPr>
+      </p:pic>
     </p:spTree>
     <p:extLst>
       <p:ext uri="{BB962C8B-B14F-4D97-AF65-F5344CB8AC3E}">
@@ -6389,6 +6955,95 @@
           </a:p>
         </p:txBody>
       </p:sp>
+      <p:pic>
+        <p:nvPicPr>
+          <p:cNvPr id="19" name="Picture 18">
+            <a:extLst>
+              <a:ext uri="{FF2B5EF4-FFF2-40B4-BE49-F238E27FC236}">
+                <a16:creationId xmlns:a16="http://schemas.microsoft.com/office/drawing/2014/main" id="{CB034614-A54E-7F40-8AE5-30391E6B4211}"/>
+              </a:ext>
+            </a:extLst>
+          </p:cNvPr>
+          <p:cNvPicPr>
+            <a:picLocks noChangeAspect="1"/>
+          </p:cNvPicPr>
+          <p:nvPr/>
+        </p:nvPicPr>
+        <p:blipFill>
+          <a:blip r:embed="rId9"/>
+          <a:stretch>
+            <a:fillRect/>
+          </a:stretch>
+        </p:blipFill>
+        <p:spPr>
+          <a:xfrm>
+            <a:off x="1050384" y="3150067"/>
+            <a:ext cx="2736251" cy="1024574"/>
+          </a:xfrm>
+          <a:prstGeom prst="rect">
+            <a:avLst/>
+          </a:prstGeom>
+        </p:spPr>
+      </p:pic>
+      <p:pic>
+        <p:nvPicPr>
+          <p:cNvPr id="21" name="Picture 20">
+            <a:extLst>
+              <a:ext uri="{FF2B5EF4-FFF2-40B4-BE49-F238E27FC236}">
+                <a16:creationId xmlns:a16="http://schemas.microsoft.com/office/drawing/2014/main" id="{DFDB8745-F5DF-7D44-9CA5-FCA66383CF7F}"/>
+              </a:ext>
+            </a:extLst>
+          </p:cNvPr>
+          <p:cNvPicPr>
+            <a:picLocks noChangeAspect="1"/>
+          </p:cNvPicPr>
+          <p:nvPr/>
+        </p:nvPicPr>
+        <p:blipFill>
+          <a:blip r:embed="rId9"/>
+          <a:stretch>
+            <a:fillRect/>
+          </a:stretch>
+        </p:blipFill>
+        <p:spPr>
+          <a:xfrm>
+            <a:off x="6643047" y="3061237"/>
+            <a:ext cx="2736251" cy="1024574"/>
+          </a:xfrm>
+          <a:prstGeom prst="rect">
+            <a:avLst/>
+          </a:prstGeom>
+        </p:spPr>
+      </p:pic>
+      <p:pic>
+        <p:nvPicPr>
+          <p:cNvPr id="22" name="Picture 21">
+            <a:extLst>
+              <a:ext uri="{FF2B5EF4-FFF2-40B4-BE49-F238E27FC236}">
+                <a16:creationId xmlns:a16="http://schemas.microsoft.com/office/drawing/2014/main" id="{AC133E8B-D9FA-F344-B2E5-CB0A8BD000DD}"/>
+              </a:ext>
+            </a:extLst>
+          </p:cNvPr>
+          <p:cNvPicPr>
+            <a:picLocks noChangeAspect="1"/>
+          </p:cNvPicPr>
+          <p:nvPr/>
+        </p:nvPicPr>
+        <p:blipFill rotWithShape="1">
+          <a:blip r:embed="rId9"/>
+          <a:srcRect b="35462"/>
+          <a:stretch/>
+        </p:blipFill>
+        <p:spPr>
+          <a:xfrm>
+            <a:off x="6664066" y="5833426"/>
+            <a:ext cx="2736252" cy="661234"/>
+          </a:xfrm>
+          <a:prstGeom prst="rect">
+            <a:avLst/>
+          </a:prstGeom>
+        </p:spPr>
+      </p:pic>
     </p:spTree>
     <p:extLst>
       <p:ext uri="{BB962C8B-B14F-4D97-AF65-F5344CB8AC3E}">
@@ -7086,6 +7741,95 @@
           </a:p>
         </p:txBody>
       </p:sp>
+      <p:pic>
+        <p:nvPicPr>
+          <p:cNvPr id="20" name="Picture 19">
+            <a:extLst>
+              <a:ext uri="{FF2B5EF4-FFF2-40B4-BE49-F238E27FC236}">
+                <a16:creationId xmlns:a16="http://schemas.microsoft.com/office/drawing/2014/main" id="{0BAD73FF-1D71-E94D-9C19-F742DEF66024}"/>
+              </a:ext>
+            </a:extLst>
+          </p:cNvPr>
+          <p:cNvPicPr>
+            <a:picLocks noChangeAspect="1"/>
+          </p:cNvPicPr>
+          <p:nvPr/>
+        </p:nvPicPr>
+        <p:blipFill>
+          <a:blip r:embed="rId9"/>
+          <a:stretch>
+            <a:fillRect/>
+          </a:stretch>
+        </p:blipFill>
+        <p:spPr>
+          <a:xfrm>
+            <a:off x="1050384" y="3181597"/>
+            <a:ext cx="2736251" cy="1024574"/>
+          </a:xfrm>
+          <a:prstGeom prst="rect">
+            <a:avLst/>
+          </a:prstGeom>
+        </p:spPr>
+      </p:pic>
+      <p:pic>
+        <p:nvPicPr>
+          <p:cNvPr id="21" name="Picture 20">
+            <a:extLst>
+              <a:ext uri="{FF2B5EF4-FFF2-40B4-BE49-F238E27FC236}">
+                <a16:creationId xmlns:a16="http://schemas.microsoft.com/office/drawing/2014/main" id="{1BBF1118-5AD5-D146-B244-6E8904555DF3}"/>
+              </a:ext>
+            </a:extLst>
+          </p:cNvPr>
+          <p:cNvPicPr>
+            <a:picLocks noChangeAspect="1"/>
+          </p:cNvPicPr>
+          <p:nvPr/>
+        </p:nvPicPr>
+        <p:blipFill>
+          <a:blip r:embed="rId9"/>
+          <a:stretch>
+            <a:fillRect/>
+          </a:stretch>
+        </p:blipFill>
+        <p:spPr>
+          <a:xfrm>
+            <a:off x="6543537" y="3181597"/>
+            <a:ext cx="2736251" cy="1024574"/>
+          </a:xfrm>
+          <a:prstGeom prst="rect">
+            <a:avLst/>
+          </a:prstGeom>
+        </p:spPr>
+      </p:pic>
+      <p:pic>
+        <p:nvPicPr>
+          <p:cNvPr id="22" name="Picture 21">
+            <a:extLst>
+              <a:ext uri="{FF2B5EF4-FFF2-40B4-BE49-F238E27FC236}">
+                <a16:creationId xmlns:a16="http://schemas.microsoft.com/office/drawing/2014/main" id="{607D97AE-53A9-5B4F-BBC2-2F827910E1CE}"/>
+              </a:ext>
+            </a:extLst>
+          </p:cNvPr>
+          <p:cNvPicPr>
+            <a:picLocks noChangeAspect="1"/>
+          </p:cNvPicPr>
+          <p:nvPr/>
+        </p:nvPicPr>
+        <p:blipFill rotWithShape="1">
+          <a:blip r:embed="rId9"/>
+          <a:srcRect t="-1" b="58873"/>
+          <a:stretch/>
+        </p:blipFill>
+        <p:spPr>
+          <a:xfrm>
+            <a:off x="6664066" y="5833426"/>
+            <a:ext cx="2736252" cy="421383"/>
+          </a:xfrm>
+          <a:prstGeom prst="rect">
+            <a:avLst/>
+          </a:prstGeom>
+        </p:spPr>
+      </p:pic>
     </p:spTree>
     <p:extLst>
       <p:ext uri="{BB962C8B-B14F-4D97-AF65-F5344CB8AC3E}">
@@ -7711,7 +8455,7 @@
         <p:spPr>
           <a:xfrm>
             <a:off x="838200" y="3997384"/>
-            <a:ext cx="3942851" cy="1754326"/>
+            <a:ext cx="5331372" cy="1754326"/>
           </a:xfrm>
           <a:prstGeom prst="rect">
             <a:avLst/>
@@ -7740,22 +8484,20 @@
             </a:r>
             <a:r>
               <a:rPr lang="sv-SE" i="1" dirty="0"/>
-              <a:t>Prefix</a:t>
-            </a:r>
-          </a:p>
-          <a:p>
-            <a:pPr marL="285750" indent="-285750">
-              <a:buFontTx/>
-              <a:buChar char="-"/>
-            </a:pPr>
+              <a:t>Predicate </a:t>
+            </a:r>
             <a:r>
               <a:rPr lang="sv-SE" dirty="0"/>
-              <a:t>Type in </a:t>
-            </a:r>
-            <a:r>
-              <a:rPr lang="sv-SE" i="1" dirty="0"/>
-              <a:t>Label</a:t>
-            </a:r>
+              <a:t>in the </a:t>
+            </a:r>
+            <a:br>
+              <a:rPr lang="sv-SE" dirty="0"/>
+            </a:br>
+            <a:r>
+              <a:rPr lang="sv-SE" dirty="0"/>
+              <a:t>dropdown list</a:t>
+            </a:r>
+            <a:endParaRPr lang="sv-SE" i="1" dirty="0"/>
           </a:p>
           <a:p>
             <a:endParaRPr lang="sv-SE" dirty="0"/>
@@ -7781,10 +8523,10 @@
       </p:sp>
       <p:pic>
         <p:nvPicPr>
-          <p:cNvPr id="13" name="Picture 12">
-            <a:extLst>
-              <a:ext uri="{FF2B5EF4-FFF2-40B4-BE49-F238E27FC236}">
-                <a16:creationId xmlns:a16="http://schemas.microsoft.com/office/drawing/2014/main" id="{79489CBA-A134-4DC5-8B05-5738FB6973F4}"/>
+          <p:cNvPr id="19" name="Picture 18">
+            <a:extLst>
+              <a:ext uri="{FF2B5EF4-FFF2-40B4-BE49-F238E27FC236}">
+                <a16:creationId xmlns:a16="http://schemas.microsoft.com/office/drawing/2014/main" id="{5961409A-5020-422F-AD2D-F6924B2A0FD6}"/>
               </a:ext>
             </a:extLst>
           </p:cNvPr>
@@ -7795,41 +8537,6 @@
         </p:nvPicPr>
         <p:blipFill>
           <a:blip r:embed="rId2"/>
-          <a:stretch>
-            <a:fillRect/>
-          </a:stretch>
-        </p:blipFill>
-        <p:spPr>
-          <a:xfrm>
-            <a:off x="2889737" y="4033933"/>
-            <a:ext cx="1752600" cy="1247775"/>
-          </a:xfrm>
-          <a:prstGeom prst="rect">
-            <a:avLst/>
-          </a:prstGeom>
-          <a:ln>
-            <a:solidFill>
-              <a:schemeClr val="tx1"/>
-            </a:solidFill>
-          </a:ln>
-        </p:spPr>
-      </p:pic>
-      <p:pic>
-        <p:nvPicPr>
-          <p:cNvPr id="19" name="Picture 18">
-            <a:extLst>
-              <a:ext uri="{FF2B5EF4-FFF2-40B4-BE49-F238E27FC236}">
-                <a16:creationId xmlns:a16="http://schemas.microsoft.com/office/drawing/2014/main" id="{5961409A-5020-422F-AD2D-F6924B2A0FD6}"/>
-              </a:ext>
-            </a:extLst>
-          </p:cNvPr>
-          <p:cNvPicPr>
-            <a:picLocks noChangeAspect="1"/>
-          </p:cNvPicPr>
-          <p:nvPr/>
-        </p:nvPicPr>
-        <p:blipFill>
-          <a:blip r:embed="rId3"/>
           <a:stretch>
             <a:fillRect/>
           </a:stretch>
@@ -8078,6 +8785,111 @@
           </a:p>
         </p:txBody>
       </p:sp>
+      <p:pic>
+        <p:nvPicPr>
+          <p:cNvPr id="3" name="Picture 2">
+            <a:extLst>
+              <a:ext uri="{FF2B5EF4-FFF2-40B4-BE49-F238E27FC236}">
+                <a16:creationId xmlns:a16="http://schemas.microsoft.com/office/drawing/2014/main" id="{E2CB51E2-47B4-47B6-A595-C2CF8CCA41F4}"/>
+              </a:ext>
+            </a:extLst>
+          </p:cNvPr>
+          <p:cNvPicPr>
+            <a:picLocks noChangeAspect="1"/>
+          </p:cNvPicPr>
+          <p:nvPr/>
+        </p:nvPicPr>
+        <p:blipFill>
+          <a:blip r:embed="rId3"/>
+          <a:stretch>
+            <a:fillRect/>
+          </a:stretch>
+        </p:blipFill>
+        <p:spPr>
+          <a:xfrm>
+            <a:off x="7116401" y="1769202"/>
+            <a:ext cx="2733675" cy="1733550"/>
+          </a:xfrm>
+          <a:prstGeom prst="rect">
+            <a:avLst/>
+          </a:prstGeom>
+          <a:ln>
+            <a:solidFill>
+              <a:schemeClr val="tx1"/>
+            </a:solidFill>
+          </a:ln>
+        </p:spPr>
+      </p:pic>
+      <p:pic>
+        <p:nvPicPr>
+          <p:cNvPr id="9" name="Picture 8">
+            <a:extLst>
+              <a:ext uri="{FF2B5EF4-FFF2-40B4-BE49-F238E27FC236}">
+                <a16:creationId xmlns:a16="http://schemas.microsoft.com/office/drawing/2014/main" id="{CF235D58-354E-4156-81B6-F6001C33D82D}"/>
+              </a:ext>
+            </a:extLst>
+          </p:cNvPr>
+          <p:cNvPicPr>
+            <a:picLocks noChangeAspect="1"/>
+          </p:cNvPicPr>
+          <p:nvPr/>
+        </p:nvPicPr>
+        <p:blipFill>
+          <a:blip r:embed="rId4"/>
+          <a:stretch>
+            <a:fillRect/>
+          </a:stretch>
+        </p:blipFill>
+        <p:spPr>
+          <a:xfrm>
+            <a:off x="7077715" y="4215810"/>
+            <a:ext cx="2743200" cy="1752600"/>
+          </a:xfrm>
+          <a:prstGeom prst="rect">
+            <a:avLst/>
+          </a:prstGeom>
+          <a:ln>
+            <a:solidFill>
+              <a:schemeClr val="tx1"/>
+            </a:solidFill>
+          </a:ln>
+        </p:spPr>
+      </p:pic>
+      <p:pic>
+        <p:nvPicPr>
+          <p:cNvPr id="4" name="Picture 3">
+            <a:extLst>
+              <a:ext uri="{FF2B5EF4-FFF2-40B4-BE49-F238E27FC236}">
+                <a16:creationId xmlns:a16="http://schemas.microsoft.com/office/drawing/2014/main" id="{AAB79183-BD97-9C4B-8A08-78E3E3A1765C}"/>
+              </a:ext>
+            </a:extLst>
+          </p:cNvPr>
+          <p:cNvPicPr>
+            <a:picLocks noChangeAspect="1"/>
+          </p:cNvPicPr>
+          <p:nvPr/>
+        </p:nvPicPr>
+        <p:blipFill>
+          <a:blip r:embed="rId5"/>
+          <a:stretch>
+            <a:fillRect/>
+          </a:stretch>
+        </p:blipFill>
+        <p:spPr>
+          <a:xfrm>
+            <a:off x="4352237" y="4055321"/>
+            <a:ext cx="1969059" cy="1726179"/>
+          </a:xfrm>
+          <a:prstGeom prst="rect">
+            <a:avLst/>
+          </a:prstGeom>
+          <a:ln>
+            <a:solidFill>
+              <a:schemeClr val="tx1"/>
+            </a:solidFill>
+          </a:ln>
+        </p:spPr>
+      </p:pic>
       <p:sp>
         <p:nvSpPr>
           <p:cNvPr id="29" name="Rectangle 28">
@@ -8092,7 +8904,7 @@
         </p:nvSpPr>
         <p:spPr>
           <a:xfrm>
-            <a:off x="2950645" y="4918411"/>
+            <a:off x="4405159" y="4693107"/>
             <a:ext cx="650893" cy="173699"/>
           </a:xfrm>
           <a:prstGeom prst="rect">
@@ -8136,10 +8948,10 @@
       </p:sp>
       <p:pic>
         <p:nvPicPr>
-          <p:cNvPr id="3" name="Picture 2">
-            <a:extLst>
-              <a:ext uri="{FF2B5EF4-FFF2-40B4-BE49-F238E27FC236}">
-                <a16:creationId xmlns:a16="http://schemas.microsoft.com/office/drawing/2014/main" id="{E2CB51E2-47B4-47B6-A595-C2CF8CCA41F4}"/>
+          <p:cNvPr id="8" name="Picture 7">
+            <a:extLst>
+              <a:ext uri="{FF2B5EF4-FFF2-40B4-BE49-F238E27FC236}">
+                <a16:creationId xmlns:a16="http://schemas.microsoft.com/office/drawing/2014/main" id="{59691DC4-F1EA-9341-BE91-764482975513}"/>
               </a:ext>
             </a:extLst>
           </p:cNvPr>
@@ -8149,32 +8961,27 @@
           <p:nvPr/>
         </p:nvPicPr>
         <p:blipFill>
-          <a:blip r:embed="rId4"/>
+          <a:blip r:embed="rId6"/>
           <a:stretch>
             <a:fillRect/>
           </a:stretch>
         </p:blipFill>
         <p:spPr>
           <a:xfrm>
-            <a:off x="7116401" y="1769202"/>
-            <a:ext cx="2733675" cy="1733550"/>
-          </a:xfrm>
-          <a:prstGeom prst="rect">
-            <a:avLst/>
-          </a:prstGeom>
-          <a:ln>
-            <a:solidFill>
-              <a:schemeClr val="tx1"/>
-            </a:solidFill>
-          </a:ln>
+            <a:off x="8031491" y="4745140"/>
+            <a:ext cx="824055" cy="693941"/>
+          </a:xfrm>
+          <a:prstGeom prst="rect">
+            <a:avLst/>
+          </a:prstGeom>
         </p:spPr>
       </p:pic>
       <p:pic>
         <p:nvPicPr>
-          <p:cNvPr id="9" name="Picture 8">
-            <a:extLst>
-              <a:ext uri="{FF2B5EF4-FFF2-40B4-BE49-F238E27FC236}">
-                <a16:creationId xmlns:a16="http://schemas.microsoft.com/office/drawing/2014/main" id="{CF235D58-354E-4156-81B6-F6001C33D82D}"/>
+          <p:cNvPr id="11" name="Picture 10">
+            <a:extLst>
+              <a:ext uri="{FF2B5EF4-FFF2-40B4-BE49-F238E27FC236}">
+                <a16:creationId xmlns:a16="http://schemas.microsoft.com/office/drawing/2014/main" id="{E33FE80C-054C-1145-B421-3C75DAC19255}"/>
               </a:ext>
             </a:extLst>
           </p:cNvPr>
@@ -8184,24 +8991,19 @@
           <p:nvPr/>
         </p:nvPicPr>
         <p:blipFill>
-          <a:blip r:embed="rId5"/>
+          <a:blip r:embed="rId7"/>
           <a:stretch>
             <a:fillRect/>
           </a:stretch>
         </p:blipFill>
         <p:spPr>
           <a:xfrm>
-            <a:off x="7077715" y="4215810"/>
-            <a:ext cx="2743200" cy="1752600"/>
-          </a:xfrm>
-          <a:prstGeom prst="rect">
-            <a:avLst/>
-          </a:prstGeom>
-          <a:ln>
-            <a:solidFill>
-              <a:schemeClr val="tx1"/>
-            </a:solidFill>
-          </a:ln>
+            <a:off x="4957822" y="4390239"/>
+            <a:ext cx="1214398" cy="182160"/>
+          </a:xfrm>
+          <a:prstGeom prst="rect">
+            <a:avLst/>
+          </a:prstGeom>
         </p:spPr>
       </p:pic>
     </p:spTree>
@@ -8510,4 +9312,299 @@
     </a:ext>
   </a:extLst>
 </a:theme>
+</file>
+
+<file path=ppt/theme/theme2.xml><?xml version="1.0" encoding="utf-8"?>
+<a:theme xmlns:a="http://schemas.openxmlformats.org/drawingml/2006/main" name="Office Theme">
+  <a:themeElements>
+    <a:clrScheme name="Office">
+      <a:dk1>
+        <a:sysClr val="windowText" lastClr="000000"/>
+      </a:dk1>
+      <a:lt1>
+        <a:sysClr val="window" lastClr="FFFFFF"/>
+      </a:lt1>
+      <a:dk2>
+        <a:srgbClr val="44546A"/>
+      </a:dk2>
+      <a:lt2>
+        <a:srgbClr val="E7E6E6"/>
+      </a:lt2>
+      <a:accent1>
+        <a:srgbClr val="4472C4"/>
+      </a:accent1>
+      <a:accent2>
+        <a:srgbClr val="ED7D31"/>
+      </a:accent2>
+      <a:accent3>
+        <a:srgbClr val="A5A5A5"/>
+      </a:accent3>
+      <a:accent4>
+        <a:srgbClr val="FFC000"/>
+      </a:accent4>
+      <a:accent5>
+        <a:srgbClr val="5B9BD5"/>
+      </a:accent5>
+      <a:accent6>
+        <a:srgbClr val="70AD47"/>
+      </a:accent6>
+      <a:hlink>
+        <a:srgbClr val="0563C1"/>
+      </a:hlink>
+      <a:folHlink>
+        <a:srgbClr val="954F72"/>
+      </a:folHlink>
+    </a:clrScheme>
+    <a:fontScheme name="Office">
+      <a:majorFont>
+        <a:latin typeface="Calibri Light" panose="020F0302020204030204"/>
+        <a:ea typeface=""/>
+        <a:cs typeface=""/>
+        <a:font script="Jpan" typeface="游ゴシック Light"/>
+        <a:font script="Hang" typeface="맑은 고딕"/>
+        <a:font script="Hans" typeface="等线 Light"/>
+        <a:font script="Hant" typeface="新細明體"/>
+        <a:font script="Arab" typeface="Times New Roman"/>
+        <a:font script="Hebr" typeface="Times New Roman"/>
+        <a:font script="Thai" typeface="Angsana New"/>
+        <a:font script="Ethi" typeface="Nyala"/>
+        <a:font script="Beng" typeface="Vrinda"/>
+        <a:font script="Gujr" typeface="Shruti"/>
+        <a:font script="Khmr" typeface="MoolBoran"/>
+        <a:font script="Knda" typeface="Tunga"/>
+        <a:font script="Guru" typeface="Raavi"/>
+        <a:font script="Cans" typeface="Euphemia"/>
+        <a:font script="Cher" typeface="Plantagenet Cherokee"/>
+        <a:font script="Yiii" typeface="Microsoft Yi Baiti"/>
+        <a:font script="Tibt" typeface="Microsoft Himalaya"/>
+        <a:font script="Thaa" typeface="MV Boli"/>
+        <a:font script="Deva" typeface="Mangal"/>
+        <a:font script="Telu" typeface="Gautami"/>
+        <a:font script="Taml" typeface="Latha"/>
+        <a:font script="Syrc" typeface="Estrangelo Edessa"/>
+        <a:font script="Orya" typeface="Kalinga"/>
+        <a:font script="Mlym" typeface="Kartika"/>
+        <a:font script="Laoo" typeface="DokChampa"/>
+        <a:font script="Sinh" typeface="Iskoola Pota"/>
+        <a:font script="Mong" typeface="Mongolian Baiti"/>
+        <a:font script="Viet" typeface="Times New Roman"/>
+        <a:font script="Uigh" typeface="Microsoft Uighur"/>
+        <a:font script="Geor" typeface="Sylfaen"/>
+        <a:font script="Armn" typeface="Arial"/>
+        <a:font script="Bugi" typeface="Leelawadee UI"/>
+        <a:font script="Bopo" typeface="Microsoft JhengHei"/>
+        <a:font script="Java" typeface="Javanese Text"/>
+        <a:font script="Lisu" typeface="Segoe UI"/>
+        <a:font script="Mymr" typeface="Myanmar Text"/>
+        <a:font script="Nkoo" typeface="Ebrima"/>
+        <a:font script="Olck" typeface="Nirmala UI"/>
+        <a:font script="Osma" typeface="Ebrima"/>
+        <a:font script="Phag" typeface="Phagspa"/>
+        <a:font script="Syrn" typeface="Estrangelo Edessa"/>
+        <a:font script="Syrj" typeface="Estrangelo Edessa"/>
+        <a:font script="Syre" typeface="Estrangelo Edessa"/>
+        <a:font script="Sora" typeface="Nirmala UI"/>
+        <a:font script="Tale" typeface="Microsoft Tai Le"/>
+        <a:font script="Talu" typeface="Microsoft New Tai Lue"/>
+        <a:font script="Tfng" typeface="Ebrima"/>
+      </a:majorFont>
+      <a:minorFont>
+        <a:latin typeface="Calibri" panose="020F0502020204030204"/>
+        <a:ea typeface=""/>
+        <a:cs typeface=""/>
+        <a:font script="Jpan" typeface="游ゴシック"/>
+        <a:font script="Hang" typeface="맑은 고딕"/>
+        <a:font script="Hans" typeface="等线"/>
+        <a:font script="Hant" typeface="新細明體"/>
+        <a:font script="Arab" typeface="Arial"/>
+        <a:font script="Hebr" typeface="Arial"/>
+        <a:font script="Thai" typeface="Cordia New"/>
+        <a:font script="Ethi" typeface="Nyala"/>
+        <a:font script="Beng" typeface="Vrinda"/>
+        <a:font script="Gujr" typeface="Shruti"/>
+        <a:font script="Khmr" typeface="DaunPenh"/>
+        <a:font script="Knda" typeface="Tunga"/>
+        <a:font script="Guru" typeface="Raavi"/>
+        <a:font script="Cans" typeface="Euphemia"/>
+        <a:font script="Cher" typeface="Plantagenet Cherokee"/>
+        <a:font script="Yiii" typeface="Microsoft Yi Baiti"/>
+        <a:font script="Tibt" typeface="Microsoft Himalaya"/>
+        <a:font script="Thaa" typeface="MV Boli"/>
+        <a:font script="Deva" typeface="Mangal"/>
+        <a:font script="Telu" typeface="Gautami"/>
+        <a:font script="Taml" typeface="Latha"/>
+        <a:font script="Syrc" typeface="Estrangelo Edessa"/>
+        <a:font script="Orya" typeface="Kalinga"/>
+        <a:font script="Mlym" typeface="Kartika"/>
+        <a:font script="Laoo" typeface="DokChampa"/>
+        <a:font script="Sinh" typeface="Iskoola Pota"/>
+        <a:font script="Mong" typeface="Mongolian Baiti"/>
+        <a:font script="Viet" typeface="Arial"/>
+        <a:font script="Uigh" typeface="Microsoft Uighur"/>
+        <a:font script="Geor" typeface="Sylfaen"/>
+        <a:font script="Armn" typeface="Arial"/>
+        <a:font script="Bugi" typeface="Leelawadee UI"/>
+        <a:font script="Bopo" typeface="Microsoft JhengHei"/>
+        <a:font script="Java" typeface="Javanese Text"/>
+        <a:font script="Lisu" typeface="Segoe UI"/>
+        <a:font script="Mymr" typeface="Myanmar Text"/>
+        <a:font script="Nkoo" typeface="Ebrima"/>
+        <a:font script="Olck" typeface="Nirmala UI"/>
+        <a:font script="Osma" typeface="Ebrima"/>
+        <a:font script="Phag" typeface="Phagspa"/>
+        <a:font script="Syrn" typeface="Estrangelo Edessa"/>
+        <a:font script="Syrj" typeface="Estrangelo Edessa"/>
+        <a:font script="Syre" typeface="Estrangelo Edessa"/>
+        <a:font script="Sora" typeface="Nirmala UI"/>
+        <a:font script="Tale" typeface="Microsoft Tai Le"/>
+        <a:font script="Talu" typeface="Microsoft New Tai Lue"/>
+        <a:font script="Tfng" typeface="Ebrima"/>
+      </a:minorFont>
+    </a:fontScheme>
+    <a:fmtScheme name="Office">
+      <a:fillStyleLst>
+        <a:solidFill>
+          <a:schemeClr val="phClr"/>
+        </a:solidFill>
+        <a:gradFill rotWithShape="1">
+          <a:gsLst>
+            <a:gs pos="0">
+              <a:schemeClr val="phClr">
+                <a:lumMod val="110000"/>
+                <a:satMod val="105000"/>
+                <a:tint val="67000"/>
+              </a:schemeClr>
+            </a:gs>
+            <a:gs pos="50000">
+              <a:schemeClr val="phClr">
+                <a:lumMod val="105000"/>
+                <a:satMod val="103000"/>
+                <a:tint val="73000"/>
+              </a:schemeClr>
+            </a:gs>
+            <a:gs pos="100000">
+              <a:schemeClr val="phClr">
+                <a:lumMod val="105000"/>
+                <a:satMod val="109000"/>
+                <a:tint val="81000"/>
+              </a:schemeClr>
+            </a:gs>
+          </a:gsLst>
+          <a:lin ang="5400000" scaled="0"/>
+        </a:gradFill>
+        <a:gradFill rotWithShape="1">
+          <a:gsLst>
+            <a:gs pos="0">
+              <a:schemeClr val="phClr">
+                <a:satMod val="103000"/>
+                <a:lumMod val="102000"/>
+                <a:tint val="94000"/>
+              </a:schemeClr>
+            </a:gs>
+            <a:gs pos="50000">
+              <a:schemeClr val="phClr">
+                <a:satMod val="110000"/>
+                <a:lumMod val="100000"/>
+                <a:shade val="100000"/>
+              </a:schemeClr>
+            </a:gs>
+            <a:gs pos="100000">
+              <a:schemeClr val="phClr">
+                <a:lumMod val="99000"/>
+                <a:satMod val="120000"/>
+                <a:shade val="78000"/>
+              </a:schemeClr>
+            </a:gs>
+          </a:gsLst>
+          <a:lin ang="5400000" scaled="0"/>
+        </a:gradFill>
+      </a:fillStyleLst>
+      <a:lnStyleLst>
+        <a:ln w="6350" cap="flat" cmpd="sng" algn="ctr">
+          <a:solidFill>
+            <a:schemeClr val="phClr"/>
+          </a:solidFill>
+          <a:prstDash val="solid"/>
+          <a:miter lim="800000"/>
+        </a:ln>
+        <a:ln w="12700" cap="flat" cmpd="sng" algn="ctr">
+          <a:solidFill>
+            <a:schemeClr val="phClr"/>
+          </a:solidFill>
+          <a:prstDash val="solid"/>
+          <a:miter lim="800000"/>
+        </a:ln>
+        <a:ln w="19050" cap="flat" cmpd="sng" algn="ctr">
+          <a:solidFill>
+            <a:schemeClr val="phClr"/>
+          </a:solidFill>
+          <a:prstDash val="solid"/>
+          <a:miter lim="800000"/>
+        </a:ln>
+      </a:lnStyleLst>
+      <a:effectStyleLst>
+        <a:effectStyle>
+          <a:effectLst/>
+        </a:effectStyle>
+        <a:effectStyle>
+          <a:effectLst/>
+        </a:effectStyle>
+        <a:effectStyle>
+          <a:effectLst>
+            <a:outerShdw blurRad="57150" dist="19050" dir="5400000" algn="ctr" rotWithShape="0">
+              <a:srgbClr val="000000">
+                <a:alpha val="63000"/>
+              </a:srgbClr>
+            </a:outerShdw>
+          </a:effectLst>
+        </a:effectStyle>
+      </a:effectStyleLst>
+      <a:bgFillStyleLst>
+        <a:solidFill>
+          <a:schemeClr val="phClr"/>
+        </a:solidFill>
+        <a:solidFill>
+          <a:schemeClr val="phClr">
+            <a:tint val="95000"/>
+            <a:satMod val="170000"/>
+          </a:schemeClr>
+        </a:solidFill>
+        <a:gradFill rotWithShape="1">
+          <a:gsLst>
+            <a:gs pos="0">
+              <a:schemeClr val="phClr">
+                <a:tint val="93000"/>
+                <a:satMod val="150000"/>
+                <a:shade val="98000"/>
+                <a:lumMod val="102000"/>
+              </a:schemeClr>
+            </a:gs>
+            <a:gs pos="50000">
+              <a:schemeClr val="phClr">
+                <a:tint val="98000"/>
+                <a:satMod val="130000"/>
+                <a:shade val="90000"/>
+                <a:lumMod val="103000"/>
+              </a:schemeClr>
+            </a:gs>
+            <a:gs pos="100000">
+              <a:schemeClr val="phClr">
+                <a:shade val="63000"/>
+                <a:satMod val="120000"/>
+              </a:schemeClr>
+            </a:gs>
+          </a:gsLst>
+          <a:lin ang="5400000" scaled="0"/>
+        </a:gradFill>
+      </a:bgFillStyleLst>
+    </a:fmtScheme>
+  </a:themeElements>
+  <a:objectDefaults/>
+  <a:extraClrSchemeLst/>
+  <a:extLst>
+    <a:ext uri="{05A4C25C-085E-4340-85A3-A5531E510DB2}">
+      <thm15:themeFamily xmlns:thm15="http://schemas.microsoft.com/office/thememl/2012/main" name="Office Theme" id="{62F939B6-93AF-4DB8-9C6B-D6C7DFDC589F}" vid="{4A3C46E8-61CC-4603-A589-7422A47A8E4A}"/>
+    </a:ext>
+  </a:extLst>
+</a:theme>
 </file>
</xml_diff>

<commit_message>
Updated to reflect updates to GraphEditor
</commit_message>
<xml_diff>
--- a/EUConnect18/doc/GraphEditor introduction.pptx
+++ b/EUConnect18/doc/GraphEditor introduction.pptx
@@ -206,7 +206,7 @@
           </a:lstStyle>
           <a:p>
             <a:fld id="{EA99ECBD-0207-3547-9A52-51BCCF8FC753}" type="datetimeFigureOut">
-              <a:t>2018-10-18</a:t>
+              <a:t>2018-10-23</a:t>
             </a:fld>
             <a:endParaRPr lang="sv-SE"/>
           </a:p>
@@ -705,7 +705,7 @@
           <a:p>
             <a:fld id="{B7C88195-5F19-4398-AC35-0F647D46A257}" type="datetimeFigureOut">
               <a:rPr lang="sv-SE" smtClean="0"/>
-              <a:t>2018-10-18</a:t>
+              <a:t>2018-10-23</a:t>
             </a:fld>
             <a:endParaRPr lang="sv-SE"/>
           </a:p>
@@ -905,7 +905,7 @@
           <a:p>
             <a:fld id="{B7C88195-5F19-4398-AC35-0F647D46A257}" type="datetimeFigureOut">
               <a:rPr lang="sv-SE" smtClean="0"/>
-              <a:t>2018-10-18</a:t>
+              <a:t>2018-10-23</a:t>
             </a:fld>
             <a:endParaRPr lang="sv-SE"/>
           </a:p>
@@ -1115,7 +1115,7 @@
           <a:p>
             <a:fld id="{B7C88195-5F19-4398-AC35-0F647D46A257}" type="datetimeFigureOut">
               <a:rPr lang="sv-SE" smtClean="0"/>
-              <a:t>2018-10-18</a:t>
+              <a:t>2018-10-23</a:t>
             </a:fld>
             <a:endParaRPr lang="sv-SE"/>
           </a:p>
@@ -1315,7 +1315,7 @@
           <a:p>
             <a:fld id="{B7C88195-5F19-4398-AC35-0F647D46A257}" type="datetimeFigureOut">
               <a:rPr lang="sv-SE" smtClean="0"/>
-              <a:t>2018-10-18</a:t>
+              <a:t>2018-10-23</a:t>
             </a:fld>
             <a:endParaRPr lang="sv-SE"/>
           </a:p>
@@ -1591,7 +1591,7 @@
           <a:p>
             <a:fld id="{B7C88195-5F19-4398-AC35-0F647D46A257}" type="datetimeFigureOut">
               <a:rPr lang="sv-SE" smtClean="0"/>
-              <a:t>2018-10-18</a:t>
+              <a:t>2018-10-23</a:t>
             </a:fld>
             <a:endParaRPr lang="sv-SE"/>
           </a:p>
@@ -1859,7 +1859,7 @@
           <a:p>
             <a:fld id="{B7C88195-5F19-4398-AC35-0F647D46A257}" type="datetimeFigureOut">
               <a:rPr lang="sv-SE" smtClean="0"/>
-              <a:t>2018-10-18</a:t>
+              <a:t>2018-10-23</a:t>
             </a:fld>
             <a:endParaRPr lang="sv-SE"/>
           </a:p>
@@ -2274,7 +2274,7 @@
           <a:p>
             <a:fld id="{B7C88195-5F19-4398-AC35-0F647D46A257}" type="datetimeFigureOut">
               <a:rPr lang="sv-SE" smtClean="0"/>
-              <a:t>2018-10-18</a:t>
+              <a:t>2018-10-23</a:t>
             </a:fld>
             <a:endParaRPr lang="sv-SE"/>
           </a:p>
@@ -2416,7 +2416,7 @@
           <a:p>
             <a:fld id="{B7C88195-5F19-4398-AC35-0F647D46A257}" type="datetimeFigureOut">
               <a:rPr lang="sv-SE" smtClean="0"/>
-              <a:t>2018-10-18</a:t>
+              <a:t>2018-10-23</a:t>
             </a:fld>
             <a:endParaRPr lang="sv-SE"/>
           </a:p>
@@ -2529,7 +2529,7 @@
           <a:p>
             <a:fld id="{B7C88195-5F19-4398-AC35-0F647D46A257}" type="datetimeFigureOut">
               <a:rPr lang="sv-SE" smtClean="0"/>
-              <a:t>2018-10-18</a:t>
+              <a:t>2018-10-23</a:t>
             </a:fld>
             <a:endParaRPr lang="sv-SE"/>
           </a:p>
@@ -2842,7 +2842,7 @@
           <a:p>
             <a:fld id="{B7C88195-5F19-4398-AC35-0F647D46A257}" type="datetimeFigureOut">
               <a:rPr lang="sv-SE" smtClean="0"/>
-              <a:t>2018-10-18</a:t>
+              <a:t>2018-10-23</a:t>
             </a:fld>
             <a:endParaRPr lang="sv-SE"/>
           </a:p>
@@ -3131,7 +3131,7 @@
           <a:p>
             <a:fld id="{B7C88195-5F19-4398-AC35-0F647D46A257}" type="datetimeFigureOut">
               <a:rPr lang="sv-SE" smtClean="0"/>
-              <a:t>2018-10-18</a:t>
+              <a:t>2018-10-23</a:t>
             </a:fld>
             <a:endParaRPr lang="sv-SE"/>
           </a:p>
@@ -3374,7 +3374,7 @@
           <a:p>
             <a:fld id="{B7C88195-5F19-4398-AC35-0F647D46A257}" type="datetimeFigureOut">
               <a:rPr lang="sv-SE" smtClean="0"/>
-              <a:t>2018-10-18</a:t>
+              <a:t>2018-10-23</a:t>
             </a:fld>
             <a:endParaRPr lang="sv-SE"/>
           </a:p>
@@ -3877,12 +3877,117 @@
           <a:chExt cx="0" cy="0"/>
         </a:xfrm>
       </p:grpSpPr>
+      <p:sp>
+        <p:nvSpPr>
+          <p:cNvPr id="2" name="Title 1">
+            <a:extLst>
+              <a:ext uri="{FF2B5EF4-FFF2-40B4-BE49-F238E27FC236}">
+                <a16:creationId xmlns:a16="http://schemas.microsoft.com/office/drawing/2014/main" id="{111AC1DD-97AB-4793-B32E-7E8E72ED5842}"/>
+              </a:ext>
+            </a:extLst>
+          </p:cNvPr>
+          <p:cNvSpPr>
+            <a:spLocks noGrp="1"/>
+          </p:cNvSpPr>
+          <p:nvPr>
+            <p:ph type="title"/>
+          </p:nvPr>
+        </p:nvSpPr>
+        <p:spPr>
+          <a:xfrm>
+            <a:off x="838200" y="365126"/>
+            <a:ext cx="10515600" cy="737281"/>
+          </a:xfrm>
+        </p:spPr>
+        <p:txBody>
+          <a:bodyPr>
+            <a:normAutofit/>
+          </a:bodyPr>
+          <a:lstStyle/>
+          <a:p>
+            <a:r>
+              <a:rPr lang="sv-SE" dirty="0"/>
+              <a:t>Edit link – reverse link direction</a:t>
+            </a:r>
+          </a:p>
+        </p:txBody>
+      </p:sp>
+      <p:sp>
+        <p:nvSpPr>
+          <p:cNvPr id="17" name="TextBox 16">
+            <a:extLst>
+              <a:ext uri="{FF2B5EF4-FFF2-40B4-BE49-F238E27FC236}">
+                <a16:creationId xmlns:a16="http://schemas.microsoft.com/office/drawing/2014/main" id="{E4A37856-DEC8-47EC-9681-15BC31E6D486}"/>
+              </a:ext>
+            </a:extLst>
+          </p:cNvPr>
+          <p:cNvSpPr txBox="1"/>
+          <p:nvPr/>
+        </p:nvSpPr>
+        <p:spPr>
+          <a:xfrm>
+            <a:off x="860669" y="1362415"/>
+            <a:ext cx="5976123" cy="369332"/>
+          </a:xfrm>
+          <a:prstGeom prst="rect">
+            <a:avLst/>
+          </a:prstGeom>
+          <a:noFill/>
+        </p:spPr>
+        <p:txBody>
+          <a:bodyPr wrap="none" rtlCol="0">
+            <a:spAutoFit/>
+          </a:bodyPr>
+          <a:lstStyle/>
+          <a:p>
+            <a:r>
+              <a:rPr lang="sv-SE" dirty="0"/>
+              <a:t>1. If a link is between two IRI’s, the direction can be reveresed</a:t>
+            </a:r>
+          </a:p>
+        </p:txBody>
+      </p:sp>
+      <p:sp>
+        <p:nvSpPr>
+          <p:cNvPr id="27" name="TextBox 26">
+            <a:extLst>
+              <a:ext uri="{FF2B5EF4-FFF2-40B4-BE49-F238E27FC236}">
+                <a16:creationId xmlns:a16="http://schemas.microsoft.com/office/drawing/2014/main" id="{3E21D26C-9680-4F03-9811-A794665D1F5B}"/>
+              </a:ext>
+            </a:extLst>
+          </p:cNvPr>
+          <p:cNvSpPr txBox="1"/>
+          <p:nvPr/>
+        </p:nvSpPr>
+        <p:spPr>
+          <a:xfrm>
+            <a:off x="860668" y="4201601"/>
+            <a:ext cx="7616581" cy="369332"/>
+          </a:xfrm>
+          <a:prstGeom prst="rect">
+            <a:avLst/>
+          </a:prstGeom>
+          <a:noFill/>
+        </p:spPr>
+        <p:txBody>
+          <a:bodyPr wrap="square" rtlCol="0">
+            <a:spAutoFit/>
+          </a:bodyPr>
+          <a:lstStyle/>
+          <a:p>
+            <a:r>
+              <a:rPr lang="sv-SE" dirty="0"/>
+              <a:t>2. Links between an IRI node and String/Integer node cannot be reversed</a:t>
+            </a:r>
+          </a:p>
+        </p:txBody>
+      </p:sp>
       <p:pic>
         <p:nvPicPr>
-          <p:cNvPr id="13" name="Picture 12">
-            <a:extLst>
-              <a:ext uri="{FF2B5EF4-FFF2-40B4-BE49-F238E27FC236}">
-                <a16:creationId xmlns:a16="http://schemas.microsoft.com/office/drawing/2014/main" id="{79489CBA-A134-4DC5-8B05-5738FB6973F4}"/>
+          <p:cNvPr id="4" name="Picture 3">
+            <a:extLst>
+              <a:ext uri="{FF2B5EF4-FFF2-40B4-BE49-F238E27FC236}">
+                <a16:creationId xmlns:a16="http://schemas.microsoft.com/office/drawing/2014/main" id="{B05EC5B2-C35B-4C4F-A922-012C34B6A1EC}"/>
               </a:ext>
             </a:extLst>
           </p:cNvPr>
@@ -3899,8 +4004,68 @@
         </p:blipFill>
         <p:spPr>
           <a:xfrm>
-            <a:off x="5023337" y="2203388"/>
-            <a:ext cx="1752600" cy="1247775"/>
+            <a:off x="1066800" y="4954804"/>
+            <a:ext cx="3333750" cy="342900"/>
+          </a:xfrm>
+          <a:prstGeom prst="rect">
+            <a:avLst/>
+          </a:prstGeom>
+        </p:spPr>
+      </p:pic>
+      <p:pic>
+        <p:nvPicPr>
+          <p:cNvPr id="5" name="Picture 4">
+            <a:extLst>
+              <a:ext uri="{FF2B5EF4-FFF2-40B4-BE49-F238E27FC236}">
+                <a16:creationId xmlns:a16="http://schemas.microsoft.com/office/drawing/2014/main" id="{E180EBFE-E6DB-4681-A38C-508DBF7E2DBF}"/>
+              </a:ext>
+            </a:extLst>
+          </p:cNvPr>
+          <p:cNvPicPr>
+            <a:picLocks noChangeAspect="1"/>
+          </p:cNvPicPr>
+          <p:nvPr/>
+        </p:nvPicPr>
+        <p:blipFill>
+          <a:blip r:embed="rId3"/>
+          <a:stretch>
+            <a:fillRect/>
+          </a:stretch>
+        </p:blipFill>
+        <p:spPr>
+          <a:xfrm>
+            <a:off x="1066800" y="5438435"/>
+            <a:ext cx="3362325" cy="333375"/>
+          </a:xfrm>
+          <a:prstGeom prst="rect">
+            <a:avLst/>
+          </a:prstGeom>
+        </p:spPr>
+      </p:pic>
+      <p:pic>
+        <p:nvPicPr>
+          <p:cNvPr id="3" name="Picture 2">
+            <a:extLst>
+              <a:ext uri="{FF2B5EF4-FFF2-40B4-BE49-F238E27FC236}">
+                <a16:creationId xmlns:a16="http://schemas.microsoft.com/office/drawing/2014/main" id="{B0571E0A-352E-C845-9B92-9F4F027E5EBE}"/>
+              </a:ext>
+            </a:extLst>
+          </p:cNvPr>
+          <p:cNvPicPr>
+            <a:picLocks noChangeAspect="1"/>
+          </p:cNvPicPr>
+          <p:nvPr/>
+        </p:nvPicPr>
+        <p:blipFill>
+          <a:blip r:embed="rId4"/>
+          <a:stretch>
+            <a:fillRect/>
+          </a:stretch>
+        </p:blipFill>
+        <p:spPr>
+          <a:xfrm>
+            <a:off x="4936207" y="4868501"/>
+            <a:ext cx="2319586" cy="1039091"/>
           </a:xfrm>
           <a:prstGeom prst="rect">
             <a:avLst/>
@@ -3912,111 +4077,106 @@
           </a:ln>
         </p:spPr>
       </p:pic>
-      <p:sp>
-        <p:nvSpPr>
-          <p:cNvPr id="2" name="Title 1">
-            <a:extLst>
-              <a:ext uri="{FF2B5EF4-FFF2-40B4-BE49-F238E27FC236}">
-                <a16:creationId xmlns:a16="http://schemas.microsoft.com/office/drawing/2014/main" id="{111AC1DD-97AB-4793-B32E-7E8E72ED5842}"/>
-              </a:ext>
-            </a:extLst>
-          </p:cNvPr>
-          <p:cNvSpPr>
-            <a:spLocks noGrp="1"/>
-          </p:cNvSpPr>
-          <p:nvPr>
-            <p:ph type="title"/>
-          </p:nvPr>
-        </p:nvSpPr>
-        <p:spPr>
-          <a:xfrm>
-            <a:off x="838200" y="365126"/>
-            <a:ext cx="10515600" cy="737281"/>
-          </a:xfrm>
-        </p:spPr>
-        <p:txBody>
-          <a:bodyPr>
-            <a:normAutofit/>
-          </a:bodyPr>
-          <a:lstStyle/>
-          <a:p>
-            <a:r>
-              <a:rPr lang="sv-SE" dirty="0"/>
-              <a:t>Edit link – reverse link direction</a:t>
-            </a:r>
-          </a:p>
-        </p:txBody>
-      </p:sp>
-      <p:sp>
-        <p:nvSpPr>
-          <p:cNvPr id="17" name="TextBox 16">
-            <a:extLst>
-              <a:ext uri="{FF2B5EF4-FFF2-40B4-BE49-F238E27FC236}">
-                <a16:creationId xmlns:a16="http://schemas.microsoft.com/office/drawing/2014/main" id="{E4A37856-DEC8-47EC-9681-15BC31E6D486}"/>
-              </a:ext>
-            </a:extLst>
-          </p:cNvPr>
-          <p:cNvSpPr txBox="1"/>
-          <p:nvPr/>
-        </p:nvSpPr>
-        <p:spPr>
-          <a:xfrm>
-            <a:off x="860669" y="1362415"/>
-            <a:ext cx="5810886" cy="369332"/>
-          </a:xfrm>
-          <a:prstGeom prst="rect">
-            <a:avLst/>
-          </a:prstGeom>
-          <a:noFill/>
-        </p:spPr>
-        <p:txBody>
-          <a:bodyPr wrap="none" rtlCol="0">
-            <a:spAutoFit/>
-          </a:bodyPr>
-          <a:lstStyle/>
-          <a:p>
-            <a:r>
-              <a:rPr lang="sv-SE" dirty="0"/>
-              <a:t>1. If a link is between to IRI’s, the direction can be reveresed</a:t>
-            </a:r>
-          </a:p>
-        </p:txBody>
-      </p:sp>
-      <p:sp>
-        <p:nvSpPr>
-          <p:cNvPr id="27" name="TextBox 26">
-            <a:extLst>
-              <a:ext uri="{FF2B5EF4-FFF2-40B4-BE49-F238E27FC236}">
-                <a16:creationId xmlns:a16="http://schemas.microsoft.com/office/drawing/2014/main" id="{3E21D26C-9680-4F03-9811-A794665D1F5B}"/>
-              </a:ext>
-            </a:extLst>
-          </p:cNvPr>
-          <p:cNvSpPr txBox="1"/>
-          <p:nvPr/>
-        </p:nvSpPr>
-        <p:spPr>
-          <a:xfrm>
-            <a:off x="860668" y="4201601"/>
-            <a:ext cx="7616581" cy="369332"/>
-          </a:xfrm>
-          <a:prstGeom prst="rect">
-            <a:avLst/>
-          </a:prstGeom>
-          <a:noFill/>
-        </p:spPr>
-        <p:txBody>
-          <a:bodyPr wrap="square" rtlCol="0">
-            <a:spAutoFit/>
-          </a:bodyPr>
-          <a:lstStyle/>
-          <a:p>
-            <a:r>
-              <a:rPr lang="sv-SE" dirty="0"/>
-              <a:t>2. Links between an IRI node and String/Integer node cannot be reversed</a:t>
-            </a:r>
-          </a:p>
-        </p:txBody>
-      </p:sp>
+      <p:pic>
+        <p:nvPicPr>
+          <p:cNvPr id="9" name="Picture 8">
+            <a:extLst>
+              <a:ext uri="{FF2B5EF4-FFF2-40B4-BE49-F238E27FC236}">
+                <a16:creationId xmlns:a16="http://schemas.microsoft.com/office/drawing/2014/main" id="{3E215C0A-8E26-5245-8520-25AAEE29D27D}"/>
+              </a:ext>
+            </a:extLst>
+          </p:cNvPr>
+          <p:cNvPicPr>
+            <a:picLocks noChangeAspect="1"/>
+          </p:cNvPicPr>
+          <p:nvPr/>
+        </p:nvPicPr>
+        <p:blipFill>
+          <a:blip r:embed="rId5"/>
+          <a:stretch>
+            <a:fillRect/>
+          </a:stretch>
+        </p:blipFill>
+        <p:spPr>
+          <a:xfrm>
+            <a:off x="1417078" y="2131623"/>
+            <a:ext cx="2591719" cy="1346400"/>
+          </a:xfrm>
+          <a:prstGeom prst="rect">
+            <a:avLst/>
+          </a:prstGeom>
+          <a:ln>
+            <a:solidFill>
+              <a:schemeClr val="tx1"/>
+            </a:solidFill>
+          </a:ln>
+        </p:spPr>
+      </p:pic>
+      <p:pic>
+        <p:nvPicPr>
+          <p:cNvPr id="10" name="Picture 9">
+            <a:extLst>
+              <a:ext uri="{FF2B5EF4-FFF2-40B4-BE49-F238E27FC236}">
+                <a16:creationId xmlns:a16="http://schemas.microsoft.com/office/drawing/2014/main" id="{6A179D6B-01CE-1D4D-85A7-444E2BDD695C}"/>
+              </a:ext>
+            </a:extLst>
+          </p:cNvPr>
+          <p:cNvPicPr>
+            <a:picLocks noChangeAspect="1"/>
+          </p:cNvPicPr>
+          <p:nvPr/>
+        </p:nvPicPr>
+        <p:blipFill>
+          <a:blip r:embed="rId6"/>
+          <a:stretch>
+            <a:fillRect/>
+          </a:stretch>
+        </p:blipFill>
+        <p:spPr>
+          <a:xfrm>
+            <a:off x="5023020" y="2414377"/>
+            <a:ext cx="1774283" cy="867426"/>
+          </a:xfrm>
+          <a:prstGeom prst="rect">
+            <a:avLst/>
+          </a:prstGeom>
+          <a:ln>
+            <a:solidFill>
+              <a:schemeClr val="tx1"/>
+            </a:solidFill>
+          </a:ln>
+        </p:spPr>
+      </p:pic>
+      <p:pic>
+        <p:nvPicPr>
+          <p:cNvPr id="12" name="Picture 11">
+            <a:extLst>
+              <a:ext uri="{FF2B5EF4-FFF2-40B4-BE49-F238E27FC236}">
+                <a16:creationId xmlns:a16="http://schemas.microsoft.com/office/drawing/2014/main" id="{4310C8CF-6807-954E-9211-718CED26F2AD}"/>
+              </a:ext>
+            </a:extLst>
+          </p:cNvPr>
+          <p:cNvPicPr>
+            <a:picLocks noChangeAspect="1"/>
+          </p:cNvPicPr>
+          <p:nvPr/>
+        </p:nvPicPr>
+        <p:blipFill>
+          <a:blip r:embed="rId7"/>
+          <a:stretch>
+            <a:fillRect/>
+          </a:stretch>
+        </p:blipFill>
+        <p:spPr>
+          <a:xfrm>
+            <a:off x="5023020" y="3071886"/>
+            <a:ext cx="1679339" cy="209917"/>
+          </a:xfrm>
+          <a:prstGeom prst="rect">
+            <a:avLst/>
+          </a:prstGeom>
+        </p:spPr>
+      </p:pic>
       <p:sp>
         <p:nvSpPr>
           <p:cNvPr id="29" name="Rectangle 28">
@@ -4031,7 +4191,7 @@
         </p:nvSpPr>
         <p:spPr>
           <a:xfrm>
-            <a:off x="5757155" y="3073375"/>
+            <a:off x="5755265" y="3088103"/>
             <a:ext cx="502196" cy="193700"/>
           </a:xfrm>
           <a:prstGeom prst="rect">
@@ -4075,10 +4235,10 @@
       </p:sp>
       <p:pic>
         <p:nvPicPr>
-          <p:cNvPr id="4" name="Picture 3">
-            <a:extLst>
-              <a:ext uri="{FF2B5EF4-FFF2-40B4-BE49-F238E27FC236}">
-                <a16:creationId xmlns:a16="http://schemas.microsoft.com/office/drawing/2014/main" id="{B05EC5B2-C35B-4C4F-A922-012C34B6A1EC}"/>
+          <p:cNvPr id="14" name="Picture 13">
+            <a:extLst>
+              <a:ext uri="{FF2B5EF4-FFF2-40B4-BE49-F238E27FC236}">
+                <a16:creationId xmlns:a16="http://schemas.microsoft.com/office/drawing/2014/main" id="{D2EFCD9B-6C99-4A4B-A09F-B3D03F221F5A}"/>
               </a:ext>
             </a:extLst>
           </p:cNvPr>
@@ -4088,145 +4248,15 @@
           <p:nvPr/>
         </p:nvPicPr>
         <p:blipFill>
-          <a:blip r:embed="rId3"/>
+          <a:blip r:embed="rId8"/>
           <a:stretch>
             <a:fillRect/>
           </a:stretch>
         </p:blipFill>
         <p:spPr>
           <a:xfrm>
-            <a:off x="1066800" y="4954804"/>
-            <a:ext cx="3333750" cy="342900"/>
-          </a:xfrm>
-          <a:prstGeom prst="rect">
-            <a:avLst/>
-          </a:prstGeom>
-        </p:spPr>
-      </p:pic>
-      <p:pic>
-        <p:nvPicPr>
-          <p:cNvPr id="5" name="Picture 4">
-            <a:extLst>
-              <a:ext uri="{FF2B5EF4-FFF2-40B4-BE49-F238E27FC236}">
-                <a16:creationId xmlns:a16="http://schemas.microsoft.com/office/drawing/2014/main" id="{E180EBFE-E6DB-4681-A38C-508DBF7E2DBF}"/>
-              </a:ext>
-            </a:extLst>
-          </p:cNvPr>
-          <p:cNvPicPr>
-            <a:picLocks noChangeAspect="1"/>
-          </p:cNvPicPr>
-          <p:nvPr/>
-        </p:nvPicPr>
-        <p:blipFill>
-          <a:blip r:embed="rId4"/>
-          <a:stretch>
-            <a:fillRect/>
-          </a:stretch>
-        </p:blipFill>
-        <p:spPr>
-          <a:xfrm>
-            <a:off x="1066800" y="5438435"/>
-            <a:ext cx="3362325" cy="333375"/>
-          </a:xfrm>
-          <a:prstGeom prst="rect">
-            <a:avLst/>
-          </a:prstGeom>
-        </p:spPr>
-      </p:pic>
-      <p:pic>
-        <p:nvPicPr>
-          <p:cNvPr id="8" name="Picture 7">
-            <a:extLst>
-              <a:ext uri="{FF2B5EF4-FFF2-40B4-BE49-F238E27FC236}">
-                <a16:creationId xmlns:a16="http://schemas.microsoft.com/office/drawing/2014/main" id="{DE1C08A9-D1DF-4FDC-9551-05577137BA11}"/>
-              </a:ext>
-            </a:extLst>
-          </p:cNvPr>
-          <p:cNvPicPr>
-            <a:picLocks noChangeAspect="1"/>
-          </p:cNvPicPr>
-          <p:nvPr/>
-        </p:nvPicPr>
-        <p:blipFill>
-          <a:blip r:embed="rId5"/>
-          <a:stretch>
-            <a:fillRect/>
-          </a:stretch>
-        </p:blipFill>
-        <p:spPr>
-          <a:xfrm>
-            <a:off x="7729537" y="2239837"/>
-            <a:ext cx="2867025" cy="1114425"/>
-          </a:xfrm>
-          <a:prstGeom prst="rect">
-            <a:avLst/>
-          </a:prstGeom>
-          <a:ln>
-            <a:solidFill>
-              <a:schemeClr val="tx1"/>
-            </a:solidFill>
-          </a:ln>
-        </p:spPr>
-      </p:pic>
-      <p:pic>
-        <p:nvPicPr>
-          <p:cNvPr id="11" name="Picture 10">
-            <a:extLst>
-              <a:ext uri="{FF2B5EF4-FFF2-40B4-BE49-F238E27FC236}">
-                <a16:creationId xmlns:a16="http://schemas.microsoft.com/office/drawing/2014/main" id="{509B8BDA-0AC0-42C8-ACE1-35E2445DC026}"/>
-              </a:ext>
-            </a:extLst>
-          </p:cNvPr>
-          <p:cNvPicPr>
-            <a:picLocks noChangeAspect="1"/>
-          </p:cNvPicPr>
-          <p:nvPr/>
-        </p:nvPicPr>
-        <p:blipFill>
-          <a:blip r:embed="rId6"/>
-          <a:stretch>
-            <a:fillRect/>
-          </a:stretch>
-        </p:blipFill>
-        <p:spPr>
-          <a:xfrm>
-            <a:off x="1202712" y="2270062"/>
-            <a:ext cx="2867025" cy="1114425"/>
-          </a:xfrm>
-          <a:prstGeom prst="rect">
-            <a:avLst/>
-          </a:prstGeom>
-          <a:ln>
-            <a:solidFill>
-              <a:schemeClr val="tx1"/>
-            </a:solidFill>
-          </a:ln>
-        </p:spPr>
-      </p:pic>
-      <p:pic>
-        <p:nvPicPr>
-          <p:cNvPr id="3" name="Picture 2">
-            <a:extLst>
-              <a:ext uri="{FF2B5EF4-FFF2-40B4-BE49-F238E27FC236}">
-                <a16:creationId xmlns:a16="http://schemas.microsoft.com/office/drawing/2014/main" id="{B0571E0A-352E-C845-9B92-9F4F027E5EBE}"/>
-              </a:ext>
-            </a:extLst>
-          </p:cNvPr>
-          <p:cNvPicPr>
-            <a:picLocks noChangeAspect="1"/>
-          </p:cNvPicPr>
-          <p:nvPr/>
-        </p:nvPicPr>
-        <p:blipFill>
-          <a:blip r:embed="rId7"/>
-          <a:stretch>
-            <a:fillRect/>
-          </a:stretch>
-        </p:blipFill>
-        <p:spPr>
-          <a:xfrm>
-            <a:off x="4936207" y="4868501"/>
-            <a:ext cx="2319586" cy="1039091"/>
+            <a:off x="7716582" y="2131623"/>
+            <a:ext cx="2584901" cy="1346400"/>
           </a:xfrm>
           <a:prstGeom prst="rect">
             <a:avLst/>
@@ -5578,7 +5608,12 @@
             <p:ph sz="half" idx="2"/>
           </p:nvPr>
         </p:nvSpPr>
-        <p:spPr/>
+        <p:spPr>
+          <a:xfrm>
+            <a:off x="5410196" y="1825625"/>
+            <a:ext cx="5181600" cy="4351338"/>
+          </a:xfrm>
+        </p:spPr>
         <p:txBody>
           <a:bodyPr/>
           <a:lstStyle/>
@@ -5768,6 +5803,126 @@
           <a:xfrm>
             <a:off x="3403758" y="4992148"/>
             <a:ext cx="1728788" cy="207455"/>
+          </a:xfrm>
+          <a:prstGeom prst="rect">
+            <a:avLst/>
+          </a:prstGeom>
+        </p:spPr>
+      </p:pic>
+      <p:pic>
+        <p:nvPicPr>
+          <p:cNvPr id="4" name="Picture 3">
+            <a:extLst>
+              <a:ext uri="{FF2B5EF4-FFF2-40B4-BE49-F238E27FC236}">
+                <a16:creationId xmlns:a16="http://schemas.microsoft.com/office/drawing/2014/main" id="{13610422-A3A5-924B-8977-00AE145EC26E}"/>
+              </a:ext>
+            </a:extLst>
+          </p:cNvPr>
+          <p:cNvPicPr>
+            <a:picLocks noChangeAspect="1"/>
+          </p:cNvPicPr>
+          <p:nvPr/>
+        </p:nvPicPr>
+        <p:blipFill>
+          <a:blip r:embed="rId14"/>
+          <a:stretch>
+            <a:fillRect/>
+          </a:stretch>
+        </p:blipFill>
+        <p:spPr>
+          <a:xfrm>
+            <a:off x="9595547" y="2324073"/>
+            <a:ext cx="977900" cy="266700"/>
+          </a:xfrm>
+          <a:prstGeom prst="rect">
+            <a:avLst/>
+          </a:prstGeom>
+        </p:spPr>
+      </p:pic>
+      <p:pic>
+        <p:nvPicPr>
+          <p:cNvPr id="5" name="Picture 4">
+            <a:extLst>
+              <a:ext uri="{FF2B5EF4-FFF2-40B4-BE49-F238E27FC236}">
+                <a16:creationId xmlns:a16="http://schemas.microsoft.com/office/drawing/2014/main" id="{2B62E603-85BE-3845-9FBD-F62DE73C1707}"/>
+              </a:ext>
+            </a:extLst>
+          </p:cNvPr>
+          <p:cNvPicPr>
+            <a:picLocks noChangeAspect="1"/>
+          </p:cNvPicPr>
+          <p:nvPr/>
+        </p:nvPicPr>
+        <p:blipFill>
+          <a:blip r:embed="rId15"/>
+          <a:stretch>
+            <a:fillRect/>
+          </a:stretch>
+        </p:blipFill>
+        <p:spPr>
+          <a:xfrm>
+            <a:off x="9620947" y="2712396"/>
+            <a:ext cx="952500" cy="292100"/>
+          </a:xfrm>
+          <a:prstGeom prst="rect">
+            <a:avLst/>
+          </a:prstGeom>
+        </p:spPr>
+      </p:pic>
+      <p:pic>
+        <p:nvPicPr>
+          <p:cNvPr id="6" name="Picture 5">
+            <a:extLst>
+              <a:ext uri="{FF2B5EF4-FFF2-40B4-BE49-F238E27FC236}">
+                <a16:creationId xmlns:a16="http://schemas.microsoft.com/office/drawing/2014/main" id="{679DB92D-2C59-6B40-9C26-CA89D607A385}"/>
+              </a:ext>
+            </a:extLst>
+          </p:cNvPr>
+          <p:cNvPicPr>
+            <a:picLocks noChangeAspect="1"/>
+          </p:cNvPicPr>
+          <p:nvPr/>
+        </p:nvPicPr>
+        <p:blipFill>
+          <a:blip r:embed="rId16"/>
+          <a:stretch>
+            <a:fillRect/>
+          </a:stretch>
+        </p:blipFill>
+        <p:spPr>
+          <a:xfrm>
+            <a:off x="9648657" y="3144849"/>
+            <a:ext cx="762000" cy="279400"/>
+          </a:xfrm>
+          <a:prstGeom prst="rect">
+            <a:avLst/>
+          </a:prstGeom>
+        </p:spPr>
+      </p:pic>
+      <p:pic>
+        <p:nvPicPr>
+          <p:cNvPr id="9" name="Picture 8">
+            <a:extLst>
+              <a:ext uri="{FF2B5EF4-FFF2-40B4-BE49-F238E27FC236}">
+                <a16:creationId xmlns:a16="http://schemas.microsoft.com/office/drawing/2014/main" id="{F6BB392D-2633-1248-A0AF-E9ACB4DDF5A4}"/>
+              </a:ext>
+            </a:extLst>
+          </p:cNvPr>
+          <p:cNvPicPr>
+            <a:picLocks noChangeAspect="1"/>
+          </p:cNvPicPr>
+          <p:nvPr/>
+        </p:nvPicPr>
+        <p:blipFill>
+          <a:blip r:embed="rId17"/>
+          <a:stretch>
+            <a:fillRect/>
+          </a:stretch>
+        </p:blipFill>
+        <p:spPr>
+          <a:xfrm>
+            <a:off x="9607092" y="3535112"/>
+            <a:ext cx="2413000" cy="330200"/>
           </a:xfrm>
           <a:prstGeom prst="rect">
             <a:avLst/>
@@ -6744,7 +6899,7 @@
             </a:r>
             <a:r>
               <a:rPr lang="sv-SE" i="1" dirty="0"/>
-              <a:t>Prefix</a:t>
+              <a:t>Type </a:t>
             </a:r>
           </a:p>
           <a:p>
@@ -6758,7 +6913,7 @@
             </a:r>
             <a:r>
               <a:rPr lang="sv-SE" i="1" dirty="0"/>
-              <a:t>Type</a:t>
+              <a:t>Prefix</a:t>
             </a:r>
           </a:p>
           <a:p>
@@ -6796,10 +6951,10 @@
       </p:sp>
       <p:pic>
         <p:nvPicPr>
-          <p:cNvPr id="23" name="Picture 22">
-            <a:extLst>
-              <a:ext uri="{FF2B5EF4-FFF2-40B4-BE49-F238E27FC236}">
-                <a16:creationId xmlns:a16="http://schemas.microsoft.com/office/drawing/2014/main" id="{C0B66585-EE44-470F-ADFC-199EE60BF913}"/>
+          <p:cNvPr id="26" name="Picture 25">
+            <a:extLst>
+              <a:ext uri="{FF2B5EF4-FFF2-40B4-BE49-F238E27FC236}">
+                <a16:creationId xmlns:a16="http://schemas.microsoft.com/office/drawing/2014/main" id="{949BE9E0-4C06-4CDD-A8B9-17F1AAFD90D0}"/>
               </a:ext>
             </a:extLst>
           </p:cNvPr>
@@ -6816,8 +6971,8 @@
         </p:blipFill>
         <p:spPr>
           <a:xfrm>
-            <a:off x="3260727" y="4615247"/>
-            <a:ext cx="1600200" cy="1514475"/>
+            <a:off x="6509929" y="4860946"/>
+            <a:ext cx="3946621" cy="1741037"/>
           </a:xfrm>
           <a:prstGeom prst="rect">
             <a:avLst/>
@@ -6829,12 +6984,47 @@
           </a:ln>
         </p:spPr>
       </p:pic>
+      <p:sp>
+        <p:nvSpPr>
+          <p:cNvPr id="27" name="TextBox 26">
+            <a:extLst>
+              <a:ext uri="{FF2B5EF4-FFF2-40B4-BE49-F238E27FC236}">
+                <a16:creationId xmlns:a16="http://schemas.microsoft.com/office/drawing/2014/main" id="{3E21D26C-9680-4F03-9811-A794665D1F5B}"/>
+              </a:ext>
+            </a:extLst>
+          </p:cNvPr>
+          <p:cNvSpPr txBox="1"/>
+          <p:nvPr/>
+        </p:nvSpPr>
+        <p:spPr>
+          <a:xfrm>
+            <a:off x="6430053" y="4541076"/>
+            <a:ext cx="3942851" cy="369332"/>
+          </a:xfrm>
+          <a:prstGeom prst="rect">
+            <a:avLst/>
+          </a:prstGeom>
+          <a:noFill/>
+        </p:spPr>
+        <p:txBody>
+          <a:bodyPr wrap="square" rtlCol="0">
+            <a:spAutoFit/>
+          </a:bodyPr>
+          <a:lstStyle/>
+          <a:p>
+            <a:r>
+              <a:rPr lang="sv-SE" dirty="0"/>
+              <a:t>4. Node prefix and label is updated</a:t>
+            </a:r>
+          </a:p>
+        </p:txBody>
+      </p:sp>
       <p:pic>
         <p:nvPicPr>
-          <p:cNvPr id="26" name="Picture 25">
-            <a:extLst>
-              <a:ext uri="{FF2B5EF4-FFF2-40B4-BE49-F238E27FC236}">
-                <a16:creationId xmlns:a16="http://schemas.microsoft.com/office/drawing/2014/main" id="{949BE9E0-4C06-4CDD-A8B9-17F1AAFD90D0}"/>
+          <p:cNvPr id="19" name="Picture 18">
+            <a:extLst>
+              <a:ext uri="{FF2B5EF4-FFF2-40B4-BE49-F238E27FC236}">
+                <a16:creationId xmlns:a16="http://schemas.microsoft.com/office/drawing/2014/main" id="{CB034614-A54E-7F40-8AE5-30391E6B4211}"/>
               </a:ext>
             </a:extLst>
           </p:cNvPr>
@@ -6851,8 +7041,97 @@
         </p:blipFill>
         <p:spPr>
           <a:xfrm>
-            <a:off x="6509929" y="4860946"/>
-            <a:ext cx="3946621" cy="1741037"/>
+            <a:off x="1050384" y="3150067"/>
+            <a:ext cx="2736251" cy="1024574"/>
+          </a:xfrm>
+          <a:prstGeom prst="rect">
+            <a:avLst/>
+          </a:prstGeom>
+        </p:spPr>
+      </p:pic>
+      <p:pic>
+        <p:nvPicPr>
+          <p:cNvPr id="21" name="Picture 20">
+            <a:extLst>
+              <a:ext uri="{FF2B5EF4-FFF2-40B4-BE49-F238E27FC236}">
+                <a16:creationId xmlns:a16="http://schemas.microsoft.com/office/drawing/2014/main" id="{DFDB8745-F5DF-7D44-9CA5-FCA66383CF7F}"/>
+              </a:ext>
+            </a:extLst>
+          </p:cNvPr>
+          <p:cNvPicPr>
+            <a:picLocks noChangeAspect="1"/>
+          </p:cNvPicPr>
+          <p:nvPr/>
+        </p:nvPicPr>
+        <p:blipFill>
+          <a:blip r:embed="rId8"/>
+          <a:stretch>
+            <a:fillRect/>
+          </a:stretch>
+        </p:blipFill>
+        <p:spPr>
+          <a:xfrm>
+            <a:off x="6643047" y="3061237"/>
+            <a:ext cx="2736251" cy="1024574"/>
+          </a:xfrm>
+          <a:prstGeom prst="rect">
+            <a:avLst/>
+          </a:prstGeom>
+        </p:spPr>
+      </p:pic>
+      <p:pic>
+        <p:nvPicPr>
+          <p:cNvPr id="22" name="Picture 21">
+            <a:extLst>
+              <a:ext uri="{FF2B5EF4-FFF2-40B4-BE49-F238E27FC236}">
+                <a16:creationId xmlns:a16="http://schemas.microsoft.com/office/drawing/2014/main" id="{AC133E8B-D9FA-F344-B2E5-CB0A8BD000DD}"/>
+              </a:ext>
+            </a:extLst>
+          </p:cNvPr>
+          <p:cNvPicPr>
+            <a:picLocks noChangeAspect="1"/>
+          </p:cNvPicPr>
+          <p:nvPr/>
+        </p:nvPicPr>
+        <p:blipFill rotWithShape="1">
+          <a:blip r:embed="rId8"/>
+          <a:srcRect b="35462"/>
+          <a:stretch/>
+        </p:blipFill>
+        <p:spPr>
+          <a:xfrm>
+            <a:off x="6664066" y="5833426"/>
+            <a:ext cx="2736252" cy="661234"/>
+          </a:xfrm>
+          <a:prstGeom prst="rect">
+            <a:avLst/>
+          </a:prstGeom>
+        </p:spPr>
+      </p:pic>
+      <p:pic>
+        <p:nvPicPr>
+          <p:cNvPr id="3" name="Picture 2">
+            <a:extLst>
+              <a:ext uri="{FF2B5EF4-FFF2-40B4-BE49-F238E27FC236}">
+                <a16:creationId xmlns:a16="http://schemas.microsoft.com/office/drawing/2014/main" id="{7B97385B-136D-3147-BEEE-0AC05E841147}"/>
+              </a:ext>
+            </a:extLst>
+          </p:cNvPr>
+          <p:cNvPicPr>
+            <a:picLocks noChangeAspect="1"/>
+          </p:cNvPicPr>
+          <p:nvPr/>
+        </p:nvPicPr>
+        <p:blipFill>
+          <a:blip r:embed="rId9"/>
+          <a:stretch>
+            <a:fillRect/>
+          </a:stretch>
+        </p:blipFill>
+        <p:spPr>
+          <a:xfrm>
+            <a:off x="3557114" y="4672173"/>
+            <a:ext cx="1413905" cy="1439929"/>
           </a:xfrm>
           <a:prstGeom prst="rect">
             <a:avLst/>
@@ -6864,47 +7143,42 @@
           </a:ln>
         </p:spPr>
       </p:pic>
-      <p:sp>
-        <p:nvSpPr>
-          <p:cNvPr id="27" name="TextBox 26">
-            <a:extLst>
-              <a:ext uri="{FF2B5EF4-FFF2-40B4-BE49-F238E27FC236}">
-                <a16:creationId xmlns:a16="http://schemas.microsoft.com/office/drawing/2014/main" id="{3E21D26C-9680-4F03-9811-A794665D1F5B}"/>
-              </a:ext>
-            </a:extLst>
-          </p:cNvPr>
-          <p:cNvSpPr txBox="1"/>
-          <p:nvPr/>
-        </p:nvSpPr>
-        <p:spPr>
-          <a:xfrm>
-            <a:off x="6430053" y="4541076"/>
-            <a:ext cx="3942851" cy="369332"/>
-          </a:xfrm>
-          <a:prstGeom prst="rect">
-            <a:avLst/>
-          </a:prstGeom>
-          <a:noFill/>
-        </p:spPr>
-        <p:txBody>
-          <a:bodyPr wrap="square" rtlCol="0">
-            <a:spAutoFit/>
-          </a:bodyPr>
-          <a:lstStyle/>
-          <a:p>
-            <a:r>
-              <a:rPr lang="sv-SE" dirty="0"/>
-              <a:t>4. Node prefix and label is updated</a:t>
-            </a:r>
-          </a:p>
-        </p:txBody>
-      </p:sp>
-      <p:sp>
-        <p:nvSpPr>
-          <p:cNvPr id="29" name="Rectangle 28">
-            <a:extLst>
-              <a:ext uri="{FF2B5EF4-FFF2-40B4-BE49-F238E27FC236}">
-                <a16:creationId xmlns:a16="http://schemas.microsoft.com/office/drawing/2014/main" id="{B4C7CB20-B498-45DC-B451-88D3ECE99D10}"/>
+      <p:pic>
+        <p:nvPicPr>
+          <p:cNvPr id="25" name="Picture 24">
+            <a:extLst>
+              <a:ext uri="{FF2B5EF4-FFF2-40B4-BE49-F238E27FC236}">
+                <a16:creationId xmlns:a16="http://schemas.microsoft.com/office/drawing/2014/main" id="{2F4223EE-DE2A-0447-948A-71C5D4C1D23C}"/>
+              </a:ext>
+            </a:extLst>
+          </p:cNvPr>
+          <p:cNvPicPr>
+            <a:picLocks noChangeAspect="1"/>
+          </p:cNvPicPr>
+          <p:nvPr/>
+        </p:nvPicPr>
+        <p:blipFill>
+          <a:blip r:embed="rId10"/>
+          <a:stretch>
+            <a:fillRect/>
+          </a:stretch>
+        </p:blipFill>
+        <p:spPr>
+          <a:xfrm>
+            <a:off x="3591346" y="5895618"/>
+            <a:ext cx="1125921" cy="190834"/>
+          </a:xfrm>
+          <a:prstGeom prst="rect">
+            <a:avLst/>
+          </a:prstGeom>
+        </p:spPr>
+      </p:pic>
+      <p:sp>
+        <p:nvSpPr>
+          <p:cNvPr id="24" name="Rectangle 23">
+            <a:extLst>
+              <a:ext uri="{FF2B5EF4-FFF2-40B4-BE49-F238E27FC236}">
+                <a16:creationId xmlns:a16="http://schemas.microsoft.com/office/drawing/2014/main" id="{F6BAB890-EC8F-A64A-B137-99B8603FB3DA}"/>
               </a:ext>
             </a:extLst>
           </p:cNvPr>
@@ -6913,8 +7187,8 @@
         </p:nvSpPr>
         <p:spPr>
           <a:xfrm>
-            <a:off x="3331645" y="5882689"/>
-            <a:ext cx="650893" cy="173699"/>
+            <a:off x="3585767" y="5895000"/>
+            <a:ext cx="715982" cy="173699"/>
           </a:xfrm>
           <a:prstGeom prst="rect">
             <a:avLst/>
@@ -6955,95 +7229,6 @@
           </a:p>
         </p:txBody>
       </p:sp>
-      <p:pic>
-        <p:nvPicPr>
-          <p:cNvPr id="19" name="Picture 18">
-            <a:extLst>
-              <a:ext uri="{FF2B5EF4-FFF2-40B4-BE49-F238E27FC236}">
-                <a16:creationId xmlns:a16="http://schemas.microsoft.com/office/drawing/2014/main" id="{CB034614-A54E-7F40-8AE5-30391E6B4211}"/>
-              </a:ext>
-            </a:extLst>
-          </p:cNvPr>
-          <p:cNvPicPr>
-            <a:picLocks noChangeAspect="1"/>
-          </p:cNvPicPr>
-          <p:nvPr/>
-        </p:nvPicPr>
-        <p:blipFill>
-          <a:blip r:embed="rId9"/>
-          <a:stretch>
-            <a:fillRect/>
-          </a:stretch>
-        </p:blipFill>
-        <p:spPr>
-          <a:xfrm>
-            <a:off x="1050384" y="3150067"/>
-            <a:ext cx="2736251" cy="1024574"/>
-          </a:xfrm>
-          <a:prstGeom prst="rect">
-            <a:avLst/>
-          </a:prstGeom>
-        </p:spPr>
-      </p:pic>
-      <p:pic>
-        <p:nvPicPr>
-          <p:cNvPr id="21" name="Picture 20">
-            <a:extLst>
-              <a:ext uri="{FF2B5EF4-FFF2-40B4-BE49-F238E27FC236}">
-                <a16:creationId xmlns:a16="http://schemas.microsoft.com/office/drawing/2014/main" id="{DFDB8745-F5DF-7D44-9CA5-FCA66383CF7F}"/>
-              </a:ext>
-            </a:extLst>
-          </p:cNvPr>
-          <p:cNvPicPr>
-            <a:picLocks noChangeAspect="1"/>
-          </p:cNvPicPr>
-          <p:nvPr/>
-        </p:nvPicPr>
-        <p:blipFill>
-          <a:blip r:embed="rId9"/>
-          <a:stretch>
-            <a:fillRect/>
-          </a:stretch>
-        </p:blipFill>
-        <p:spPr>
-          <a:xfrm>
-            <a:off x="6643047" y="3061237"/>
-            <a:ext cx="2736251" cy="1024574"/>
-          </a:xfrm>
-          <a:prstGeom prst="rect">
-            <a:avLst/>
-          </a:prstGeom>
-        </p:spPr>
-      </p:pic>
-      <p:pic>
-        <p:nvPicPr>
-          <p:cNvPr id="22" name="Picture 21">
-            <a:extLst>
-              <a:ext uri="{FF2B5EF4-FFF2-40B4-BE49-F238E27FC236}">
-                <a16:creationId xmlns:a16="http://schemas.microsoft.com/office/drawing/2014/main" id="{AC133E8B-D9FA-F344-B2E5-CB0A8BD000DD}"/>
-              </a:ext>
-            </a:extLst>
-          </p:cNvPr>
-          <p:cNvPicPr>
-            <a:picLocks noChangeAspect="1"/>
-          </p:cNvPicPr>
-          <p:nvPr/>
-        </p:nvPicPr>
-        <p:blipFill rotWithShape="1">
-          <a:blip r:embed="rId9"/>
-          <a:srcRect b="35462"/>
-          <a:stretch/>
-        </p:blipFill>
-        <p:spPr>
-          <a:xfrm>
-            <a:off x="6664066" y="5833426"/>
-            <a:ext cx="2736252" cy="661234"/>
-          </a:xfrm>
-          <a:prstGeom prst="rect">
-            <a:avLst/>
-          </a:prstGeom>
-        </p:spPr>
-      </p:pic>
     </p:spTree>
     <p:extLst>
       <p:ext uri="{BB962C8B-B14F-4D97-AF65-F5344CB8AC3E}">
@@ -7074,6 +7259,41 @@
           <a:chExt cx="0" cy="0"/>
         </a:xfrm>
       </p:grpSpPr>
+      <p:pic>
+        <p:nvPicPr>
+          <p:cNvPr id="29" name="Picture 28">
+            <a:extLst>
+              <a:ext uri="{FF2B5EF4-FFF2-40B4-BE49-F238E27FC236}">
+                <a16:creationId xmlns:a16="http://schemas.microsoft.com/office/drawing/2014/main" id="{27DB1414-7EB0-864A-842D-2F5D8AED033F}"/>
+              </a:ext>
+            </a:extLst>
+          </p:cNvPr>
+          <p:cNvPicPr>
+            <a:picLocks noChangeAspect="1"/>
+          </p:cNvPicPr>
+          <p:nvPr/>
+        </p:nvPicPr>
+        <p:blipFill>
+          <a:blip r:embed="rId2"/>
+          <a:stretch>
+            <a:fillRect/>
+          </a:stretch>
+        </p:blipFill>
+        <p:spPr>
+          <a:xfrm>
+            <a:off x="3413569" y="4885196"/>
+            <a:ext cx="1413905" cy="1439929"/>
+          </a:xfrm>
+          <a:prstGeom prst="rect">
+            <a:avLst/>
+          </a:prstGeom>
+          <a:ln>
+            <a:solidFill>
+              <a:schemeClr val="tx1"/>
+            </a:solidFill>
+          </a:ln>
+        </p:spPr>
+      </p:pic>
       <p:sp>
         <p:nvSpPr>
           <p:cNvPr id="2" name="Title 1">
@@ -7122,7 +7342,7 @@
           <p:nvPr/>
         </p:nvPicPr>
         <p:blipFill>
-          <a:blip r:embed="rId2"/>
+          <a:blip r:embed="rId3"/>
           <a:stretch>
             <a:fillRect/>
           </a:stretch>
@@ -7248,7 +7468,7 @@
           <p:nvPr/>
         </p:nvPicPr>
         <p:blipFill>
-          <a:blip r:embed="rId3"/>
+          <a:blip r:embed="rId4"/>
           <a:stretch>
             <a:fillRect/>
           </a:stretch>
@@ -7283,7 +7503,7 @@
           <p:nvPr/>
         </p:nvPicPr>
         <p:blipFill>
-          <a:blip r:embed="rId4"/>
+          <a:blip r:embed="rId5"/>
           <a:stretch>
             <a:fillRect/>
           </a:stretch>
@@ -7431,10 +7651,10 @@
       </p:sp>
       <p:pic>
         <p:nvPicPr>
-          <p:cNvPr id="33" name="Picture 32">
-            <a:extLst>
-              <a:ext uri="{FF2B5EF4-FFF2-40B4-BE49-F238E27FC236}">
-                <a16:creationId xmlns:a16="http://schemas.microsoft.com/office/drawing/2014/main" id="{6C9384D4-4ABD-441B-B178-1A38A837DA59}"/>
+          <p:cNvPr id="3" name="Picture 2">
+            <a:extLst>
+              <a:ext uri="{FF2B5EF4-FFF2-40B4-BE49-F238E27FC236}">
+                <a16:creationId xmlns:a16="http://schemas.microsoft.com/office/drawing/2014/main" id="{76EC43AE-F70B-46EE-90DC-14EAD672AD72}"/>
               </a:ext>
             </a:extLst>
           </p:cNvPr>
@@ -7444,15 +7664,166 @@
           <p:nvPr/>
         </p:nvPicPr>
         <p:blipFill>
-          <a:blip r:embed="rId5"/>
+          <a:blip r:embed="rId6"/>
           <a:stretch>
             <a:fillRect/>
           </a:stretch>
         </p:blipFill>
         <p:spPr>
           <a:xfrm>
-            <a:off x="2809625" y="4740334"/>
-            <a:ext cx="1600200" cy="1514475"/>
+            <a:off x="1556563" y="1706094"/>
+            <a:ext cx="1253062" cy="977566"/>
+          </a:xfrm>
+          <a:prstGeom prst="rect">
+            <a:avLst/>
+          </a:prstGeom>
+        </p:spPr>
+      </p:pic>
+      <p:cxnSp>
+        <p:nvCxnSpPr>
+          <p:cNvPr id="23" name="Straight Arrow Connector 22">
+            <a:extLst>
+              <a:ext uri="{FF2B5EF4-FFF2-40B4-BE49-F238E27FC236}">
+                <a16:creationId xmlns:a16="http://schemas.microsoft.com/office/drawing/2014/main" id="{BDDCD44B-0F23-4564-A263-3671B9708D37}"/>
+              </a:ext>
+            </a:extLst>
+          </p:cNvPr>
+          <p:cNvCxnSpPr>
+            <a:cxnSpLocks/>
+          </p:cNvCxnSpPr>
+          <p:nvPr/>
+        </p:nvCxnSpPr>
+        <p:spPr>
+          <a:xfrm flipH="1">
+            <a:off x="2361330" y="2531895"/>
+            <a:ext cx="471340" cy="0"/>
+          </a:xfrm>
+          <a:prstGeom prst="straightConnector1">
+            <a:avLst/>
+          </a:prstGeom>
+          <a:ln w="57150">
+            <a:solidFill>
+              <a:schemeClr val="accent2"/>
+            </a:solidFill>
+            <a:tailEnd type="triangle"/>
+          </a:ln>
+        </p:spPr>
+        <p:style>
+          <a:lnRef idx="1">
+            <a:schemeClr val="accent1"/>
+          </a:lnRef>
+          <a:fillRef idx="0">
+            <a:schemeClr val="accent1"/>
+          </a:fillRef>
+          <a:effectRef idx="0">
+            <a:schemeClr val="accent1"/>
+          </a:effectRef>
+          <a:fontRef idx="minor">
+            <a:schemeClr val="tx1"/>
+          </a:fontRef>
+        </p:style>
+      </p:cxnSp>
+      <p:sp>
+        <p:nvSpPr>
+          <p:cNvPr id="24" name="Rectangle: Rounded Corners 23">
+            <a:extLst>
+              <a:ext uri="{FF2B5EF4-FFF2-40B4-BE49-F238E27FC236}">
+                <a16:creationId xmlns:a16="http://schemas.microsoft.com/office/drawing/2014/main" id="{C4ECE61F-D6B8-47DA-9B9E-C6366FE7FC16}"/>
+              </a:ext>
+            </a:extLst>
+          </p:cNvPr>
+          <p:cNvSpPr/>
+          <p:nvPr/>
+        </p:nvSpPr>
+        <p:spPr>
+          <a:xfrm>
+            <a:off x="2893425" y="2408975"/>
+            <a:ext cx="999062" cy="245839"/>
+          </a:xfrm>
+          <a:prstGeom prst="roundRect">
+            <a:avLst/>
+          </a:prstGeom>
+        </p:spPr>
+        <p:style>
+          <a:lnRef idx="0">
+            <a:schemeClr val="accent2"/>
+          </a:lnRef>
+          <a:fillRef idx="3">
+            <a:schemeClr val="accent2"/>
+          </a:fillRef>
+          <a:effectRef idx="3">
+            <a:schemeClr val="accent2"/>
+          </a:effectRef>
+          <a:fontRef idx="minor">
+            <a:schemeClr val="lt1"/>
+          </a:fontRef>
+        </p:style>
+        <p:txBody>
+          <a:bodyPr rtlCol="0" anchor="ctr"/>
+          <a:lstStyle/>
+          <a:p>
+            <a:pPr algn="ctr"/>
+            <a:r>
+              <a:rPr lang="sv-SE" sz="1200" dirty="0"/>
+              <a:t>Double-Click</a:t>
+            </a:r>
+          </a:p>
+        </p:txBody>
+      </p:sp>
+      <p:pic>
+        <p:nvPicPr>
+          <p:cNvPr id="6" name="Picture 5">
+            <a:extLst>
+              <a:ext uri="{FF2B5EF4-FFF2-40B4-BE49-F238E27FC236}">
+                <a16:creationId xmlns:a16="http://schemas.microsoft.com/office/drawing/2014/main" id="{FD2966B3-DD4A-4684-BF1D-A0E7305081D4}"/>
+              </a:ext>
+            </a:extLst>
+          </p:cNvPr>
+          <p:cNvPicPr>
+            <a:picLocks noChangeAspect="1"/>
+          </p:cNvPicPr>
+          <p:nvPr/>
+        </p:nvPicPr>
+        <p:blipFill>
+          <a:blip r:embed="rId7"/>
+          <a:stretch>
+            <a:fillRect/>
+          </a:stretch>
+        </p:blipFill>
+        <p:spPr>
+          <a:xfrm>
+            <a:off x="7137672" y="1587799"/>
+            <a:ext cx="1202406" cy="1026444"/>
+          </a:xfrm>
+          <a:prstGeom prst="rect">
+            <a:avLst/>
+          </a:prstGeom>
+        </p:spPr>
+      </p:pic>
+      <p:pic>
+        <p:nvPicPr>
+          <p:cNvPr id="9" name="Picture 8">
+            <a:extLst>
+              <a:ext uri="{FF2B5EF4-FFF2-40B4-BE49-F238E27FC236}">
+                <a16:creationId xmlns:a16="http://schemas.microsoft.com/office/drawing/2014/main" id="{DE002EBF-F0BC-4753-B0A2-E173E140C255}"/>
+              </a:ext>
+            </a:extLst>
+          </p:cNvPr>
+          <p:cNvPicPr>
+            <a:picLocks noChangeAspect="1"/>
+          </p:cNvPicPr>
+          <p:nvPr/>
+        </p:nvPicPr>
+        <p:blipFill>
+          <a:blip r:embed="rId8"/>
+          <a:stretch>
+            <a:fillRect/>
+          </a:stretch>
+        </p:blipFill>
+        <p:spPr>
+          <a:xfrm>
+            <a:off x="6417507" y="5129362"/>
+            <a:ext cx="3930462" cy="1187623"/>
           </a:xfrm>
           <a:prstGeom prst="rect">
             <a:avLst/>
@@ -7466,6 +7837,160 @@
       </p:pic>
       <p:sp>
         <p:nvSpPr>
+          <p:cNvPr id="36" name="TextBox 35">
+            <a:extLst>
+              <a:ext uri="{FF2B5EF4-FFF2-40B4-BE49-F238E27FC236}">
+                <a16:creationId xmlns:a16="http://schemas.microsoft.com/office/drawing/2014/main" id="{897168BC-C535-429C-BE1C-2F772C8BBA48}"/>
+              </a:ext>
+            </a:extLst>
+          </p:cNvPr>
+          <p:cNvSpPr txBox="1"/>
+          <p:nvPr/>
+        </p:nvSpPr>
+        <p:spPr>
+          <a:xfrm>
+            <a:off x="6417507" y="4663720"/>
+            <a:ext cx="4770850" cy="369332"/>
+          </a:xfrm>
+          <a:prstGeom prst="rect">
+            <a:avLst/>
+          </a:prstGeom>
+          <a:noFill/>
+        </p:spPr>
+        <p:txBody>
+          <a:bodyPr wrap="square" rtlCol="0">
+            <a:spAutoFit/>
+          </a:bodyPr>
+          <a:lstStyle/>
+          <a:p>
+            <a:r>
+              <a:rPr lang="sv-SE" dirty="0"/>
+              <a:t>3. The node and any attached links are removed</a:t>
+            </a:r>
+          </a:p>
+        </p:txBody>
+      </p:sp>
+      <p:pic>
+        <p:nvPicPr>
+          <p:cNvPr id="20" name="Picture 19">
+            <a:extLst>
+              <a:ext uri="{FF2B5EF4-FFF2-40B4-BE49-F238E27FC236}">
+                <a16:creationId xmlns:a16="http://schemas.microsoft.com/office/drawing/2014/main" id="{0BAD73FF-1D71-E94D-9C19-F742DEF66024}"/>
+              </a:ext>
+            </a:extLst>
+          </p:cNvPr>
+          <p:cNvPicPr>
+            <a:picLocks noChangeAspect="1"/>
+          </p:cNvPicPr>
+          <p:nvPr/>
+        </p:nvPicPr>
+        <p:blipFill>
+          <a:blip r:embed="rId9"/>
+          <a:stretch>
+            <a:fillRect/>
+          </a:stretch>
+        </p:blipFill>
+        <p:spPr>
+          <a:xfrm>
+            <a:off x="1050384" y="3181597"/>
+            <a:ext cx="2736251" cy="1024574"/>
+          </a:xfrm>
+          <a:prstGeom prst="rect">
+            <a:avLst/>
+          </a:prstGeom>
+        </p:spPr>
+      </p:pic>
+      <p:pic>
+        <p:nvPicPr>
+          <p:cNvPr id="21" name="Picture 20">
+            <a:extLst>
+              <a:ext uri="{FF2B5EF4-FFF2-40B4-BE49-F238E27FC236}">
+                <a16:creationId xmlns:a16="http://schemas.microsoft.com/office/drawing/2014/main" id="{1BBF1118-5AD5-D146-B244-6E8904555DF3}"/>
+              </a:ext>
+            </a:extLst>
+          </p:cNvPr>
+          <p:cNvPicPr>
+            <a:picLocks noChangeAspect="1"/>
+          </p:cNvPicPr>
+          <p:nvPr/>
+        </p:nvPicPr>
+        <p:blipFill>
+          <a:blip r:embed="rId9"/>
+          <a:stretch>
+            <a:fillRect/>
+          </a:stretch>
+        </p:blipFill>
+        <p:spPr>
+          <a:xfrm>
+            <a:off x="6543537" y="3181597"/>
+            <a:ext cx="2736251" cy="1024574"/>
+          </a:xfrm>
+          <a:prstGeom prst="rect">
+            <a:avLst/>
+          </a:prstGeom>
+        </p:spPr>
+      </p:pic>
+      <p:pic>
+        <p:nvPicPr>
+          <p:cNvPr id="22" name="Picture 21">
+            <a:extLst>
+              <a:ext uri="{FF2B5EF4-FFF2-40B4-BE49-F238E27FC236}">
+                <a16:creationId xmlns:a16="http://schemas.microsoft.com/office/drawing/2014/main" id="{607D97AE-53A9-5B4F-BBC2-2F827910E1CE}"/>
+              </a:ext>
+            </a:extLst>
+          </p:cNvPr>
+          <p:cNvPicPr>
+            <a:picLocks noChangeAspect="1"/>
+          </p:cNvPicPr>
+          <p:nvPr/>
+        </p:nvPicPr>
+        <p:blipFill rotWithShape="1">
+          <a:blip r:embed="rId9"/>
+          <a:srcRect t="-1" b="58873"/>
+          <a:stretch/>
+        </p:blipFill>
+        <p:spPr>
+          <a:xfrm>
+            <a:off x="6664066" y="5833426"/>
+            <a:ext cx="2736252" cy="421383"/>
+          </a:xfrm>
+          <a:prstGeom prst="rect">
+            <a:avLst/>
+          </a:prstGeom>
+        </p:spPr>
+      </p:pic>
+      <p:pic>
+        <p:nvPicPr>
+          <p:cNvPr id="4" name="Picture 3">
+            <a:extLst>
+              <a:ext uri="{FF2B5EF4-FFF2-40B4-BE49-F238E27FC236}">
+                <a16:creationId xmlns:a16="http://schemas.microsoft.com/office/drawing/2014/main" id="{136F99B0-513A-A84F-860D-F8553B3B9F65}"/>
+              </a:ext>
+            </a:extLst>
+          </p:cNvPr>
+          <p:cNvPicPr>
+            <a:picLocks noChangeAspect="1"/>
+          </p:cNvPicPr>
+          <p:nvPr/>
+        </p:nvPicPr>
+        <p:blipFill>
+          <a:blip r:embed="rId10"/>
+          <a:stretch>
+            <a:fillRect/>
+          </a:stretch>
+        </p:blipFill>
+        <p:spPr>
+          <a:xfrm>
+            <a:off x="3460407" y="6101907"/>
+            <a:ext cx="1125921" cy="190834"/>
+          </a:xfrm>
+          <a:prstGeom prst="rect">
+            <a:avLst/>
+          </a:prstGeom>
+        </p:spPr>
+      </p:pic>
+      <p:sp>
+        <p:nvSpPr>
           <p:cNvPr id="34" name="Rectangle 33">
             <a:extLst>
               <a:ext uri="{FF2B5EF4-FFF2-40B4-BE49-F238E27FC236}">
@@ -7478,7 +8003,7 @@
         </p:nvSpPr>
         <p:spPr>
           <a:xfrm>
-            <a:off x="3544535" y="6013332"/>
+            <a:off x="4178556" y="6088942"/>
             <a:ext cx="444568" cy="173699"/>
           </a:xfrm>
           <a:prstGeom prst="rect">
@@ -7520,316 +8045,6 @@
           </a:p>
         </p:txBody>
       </p:sp>
-      <p:pic>
-        <p:nvPicPr>
-          <p:cNvPr id="3" name="Picture 2">
-            <a:extLst>
-              <a:ext uri="{FF2B5EF4-FFF2-40B4-BE49-F238E27FC236}">
-                <a16:creationId xmlns:a16="http://schemas.microsoft.com/office/drawing/2014/main" id="{76EC43AE-F70B-46EE-90DC-14EAD672AD72}"/>
-              </a:ext>
-            </a:extLst>
-          </p:cNvPr>
-          <p:cNvPicPr>
-            <a:picLocks noChangeAspect="1"/>
-          </p:cNvPicPr>
-          <p:nvPr/>
-        </p:nvPicPr>
-        <p:blipFill>
-          <a:blip r:embed="rId6"/>
-          <a:stretch>
-            <a:fillRect/>
-          </a:stretch>
-        </p:blipFill>
-        <p:spPr>
-          <a:xfrm>
-            <a:off x="1556563" y="1706094"/>
-            <a:ext cx="1253062" cy="977566"/>
-          </a:xfrm>
-          <a:prstGeom prst="rect">
-            <a:avLst/>
-          </a:prstGeom>
-        </p:spPr>
-      </p:pic>
-      <p:cxnSp>
-        <p:nvCxnSpPr>
-          <p:cNvPr id="23" name="Straight Arrow Connector 22">
-            <a:extLst>
-              <a:ext uri="{FF2B5EF4-FFF2-40B4-BE49-F238E27FC236}">
-                <a16:creationId xmlns:a16="http://schemas.microsoft.com/office/drawing/2014/main" id="{BDDCD44B-0F23-4564-A263-3671B9708D37}"/>
-              </a:ext>
-            </a:extLst>
-          </p:cNvPr>
-          <p:cNvCxnSpPr>
-            <a:cxnSpLocks/>
-          </p:cNvCxnSpPr>
-          <p:nvPr/>
-        </p:nvCxnSpPr>
-        <p:spPr>
-          <a:xfrm flipH="1">
-            <a:off x="2361330" y="2531895"/>
-            <a:ext cx="471340" cy="0"/>
-          </a:xfrm>
-          <a:prstGeom prst="straightConnector1">
-            <a:avLst/>
-          </a:prstGeom>
-          <a:ln w="57150">
-            <a:solidFill>
-              <a:schemeClr val="accent2"/>
-            </a:solidFill>
-            <a:tailEnd type="triangle"/>
-          </a:ln>
-        </p:spPr>
-        <p:style>
-          <a:lnRef idx="1">
-            <a:schemeClr val="accent1"/>
-          </a:lnRef>
-          <a:fillRef idx="0">
-            <a:schemeClr val="accent1"/>
-          </a:fillRef>
-          <a:effectRef idx="0">
-            <a:schemeClr val="accent1"/>
-          </a:effectRef>
-          <a:fontRef idx="minor">
-            <a:schemeClr val="tx1"/>
-          </a:fontRef>
-        </p:style>
-      </p:cxnSp>
-      <p:sp>
-        <p:nvSpPr>
-          <p:cNvPr id="24" name="Rectangle: Rounded Corners 23">
-            <a:extLst>
-              <a:ext uri="{FF2B5EF4-FFF2-40B4-BE49-F238E27FC236}">
-                <a16:creationId xmlns:a16="http://schemas.microsoft.com/office/drawing/2014/main" id="{C4ECE61F-D6B8-47DA-9B9E-C6366FE7FC16}"/>
-              </a:ext>
-            </a:extLst>
-          </p:cNvPr>
-          <p:cNvSpPr/>
-          <p:nvPr/>
-        </p:nvSpPr>
-        <p:spPr>
-          <a:xfrm>
-            <a:off x="2893425" y="2408975"/>
-            <a:ext cx="999062" cy="245839"/>
-          </a:xfrm>
-          <a:prstGeom prst="roundRect">
-            <a:avLst/>
-          </a:prstGeom>
-        </p:spPr>
-        <p:style>
-          <a:lnRef idx="0">
-            <a:schemeClr val="accent2"/>
-          </a:lnRef>
-          <a:fillRef idx="3">
-            <a:schemeClr val="accent2"/>
-          </a:fillRef>
-          <a:effectRef idx="3">
-            <a:schemeClr val="accent2"/>
-          </a:effectRef>
-          <a:fontRef idx="minor">
-            <a:schemeClr val="lt1"/>
-          </a:fontRef>
-        </p:style>
-        <p:txBody>
-          <a:bodyPr rtlCol="0" anchor="ctr"/>
-          <a:lstStyle/>
-          <a:p>
-            <a:pPr algn="ctr"/>
-            <a:r>
-              <a:rPr lang="sv-SE" sz="1200" dirty="0"/>
-              <a:t>Double-Click</a:t>
-            </a:r>
-          </a:p>
-        </p:txBody>
-      </p:sp>
-      <p:pic>
-        <p:nvPicPr>
-          <p:cNvPr id="6" name="Picture 5">
-            <a:extLst>
-              <a:ext uri="{FF2B5EF4-FFF2-40B4-BE49-F238E27FC236}">
-                <a16:creationId xmlns:a16="http://schemas.microsoft.com/office/drawing/2014/main" id="{FD2966B3-DD4A-4684-BF1D-A0E7305081D4}"/>
-              </a:ext>
-            </a:extLst>
-          </p:cNvPr>
-          <p:cNvPicPr>
-            <a:picLocks noChangeAspect="1"/>
-          </p:cNvPicPr>
-          <p:nvPr/>
-        </p:nvPicPr>
-        <p:blipFill>
-          <a:blip r:embed="rId7"/>
-          <a:stretch>
-            <a:fillRect/>
-          </a:stretch>
-        </p:blipFill>
-        <p:spPr>
-          <a:xfrm>
-            <a:off x="7137672" y="1569137"/>
-            <a:ext cx="1202406" cy="1026444"/>
-          </a:xfrm>
-          <a:prstGeom prst="rect">
-            <a:avLst/>
-          </a:prstGeom>
-        </p:spPr>
-      </p:pic>
-      <p:pic>
-        <p:nvPicPr>
-          <p:cNvPr id="9" name="Picture 8">
-            <a:extLst>
-              <a:ext uri="{FF2B5EF4-FFF2-40B4-BE49-F238E27FC236}">
-                <a16:creationId xmlns:a16="http://schemas.microsoft.com/office/drawing/2014/main" id="{DE002EBF-F0BC-4753-B0A2-E173E140C255}"/>
-              </a:ext>
-            </a:extLst>
-          </p:cNvPr>
-          <p:cNvPicPr>
-            <a:picLocks noChangeAspect="1"/>
-          </p:cNvPicPr>
-          <p:nvPr/>
-        </p:nvPicPr>
-        <p:blipFill>
-          <a:blip r:embed="rId8"/>
-          <a:stretch>
-            <a:fillRect/>
-          </a:stretch>
-        </p:blipFill>
-        <p:spPr>
-          <a:xfrm>
-            <a:off x="6417507" y="5129362"/>
-            <a:ext cx="3930462" cy="1187623"/>
-          </a:xfrm>
-          <a:prstGeom prst="rect">
-            <a:avLst/>
-          </a:prstGeom>
-          <a:ln>
-            <a:solidFill>
-              <a:schemeClr val="tx1"/>
-            </a:solidFill>
-          </a:ln>
-        </p:spPr>
-      </p:pic>
-      <p:sp>
-        <p:nvSpPr>
-          <p:cNvPr id="36" name="TextBox 35">
-            <a:extLst>
-              <a:ext uri="{FF2B5EF4-FFF2-40B4-BE49-F238E27FC236}">
-                <a16:creationId xmlns:a16="http://schemas.microsoft.com/office/drawing/2014/main" id="{897168BC-C535-429C-BE1C-2F772C8BBA48}"/>
-              </a:ext>
-            </a:extLst>
-          </p:cNvPr>
-          <p:cNvSpPr txBox="1"/>
-          <p:nvPr/>
-        </p:nvSpPr>
-        <p:spPr>
-          <a:xfrm>
-            <a:off x="6417507" y="4663720"/>
-            <a:ext cx="4770850" cy="369332"/>
-          </a:xfrm>
-          <a:prstGeom prst="rect">
-            <a:avLst/>
-          </a:prstGeom>
-          <a:noFill/>
-        </p:spPr>
-        <p:txBody>
-          <a:bodyPr wrap="square" rtlCol="0">
-            <a:spAutoFit/>
-          </a:bodyPr>
-          <a:lstStyle/>
-          <a:p>
-            <a:r>
-              <a:rPr lang="sv-SE" dirty="0"/>
-              <a:t>3. The node and any attached links are removed</a:t>
-            </a:r>
-          </a:p>
-        </p:txBody>
-      </p:sp>
-      <p:pic>
-        <p:nvPicPr>
-          <p:cNvPr id="20" name="Picture 19">
-            <a:extLst>
-              <a:ext uri="{FF2B5EF4-FFF2-40B4-BE49-F238E27FC236}">
-                <a16:creationId xmlns:a16="http://schemas.microsoft.com/office/drawing/2014/main" id="{0BAD73FF-1D71-E94D-9C19-F742DEF66024}"/>
-              </a:ext>
-            </a:extLst>
-          </p:cNvPr>
-          <p:cNvPicPr>
-            <a:picLocks noChangeAspect="1"/>
-          </p:cNvPicPr>
-          <p:nvPr/>
-        </p:nvPicPr>
-        <p:blipFill>
-          <a:blip r:embed="rId9"/>
-          <a:stretch>
-            <a:fillRect/>
-          </a:stretch>
-        </p:blipFill>
-        <p:spPr>
-          <a:xfrm>
-            <a:off x="1050384" y="3181597"/>
-            <a:ext cx="2736251" cy="1024574"/>
-          </a:xfrm>
-          <a:prstGeom prst="rect">
-            <a:avLst/>
-          </a:prstGeom>
-        </p:spPr>
-      </p:pic>
-      <p:pic>
-        <p:nvPicPr>
-          <p:cNvPr id="21" name="Picture 20">
-            <a:extLst>
-              <a:ext uri="{FF2B5EF4-FFF2-40B4-BE49-F238E27FC236}">
-                <a16:creationId xmlns:a16="http://schemas.microsoft.com/office/drawing/2014/main" id="{1BBF1118-5AD5-D146-B244-6E8904555DF3}"/>
-              </a:ext>
-            </a:extLst>
-          </p:cNvPr>
-          <p:cNvPicPr>
-            <a:picLocks noChangeAspect="1"/>
-          </p:cNvPicPr>
-          <p:nvPr/>
-        </p:nvPicPr>
-        <p:blipFill>
-          <a:blip r:embed="rId9"/>
-          <a:stretch>
-            <a:fillRect/>
-          </a:stretch>
-        </p:blipFill>
-        <p:spPr>
-          <a:xfrm>
-            <a:off x="6543537" y="3181597"/>
-            <a:ext cx="2736251" cy="1024574"/>
-          </a:xfrm>
-          <a:prstGeom prst="rect">
-            <a:avLst/>
-          </a:prstGeom>
-        </p:spPr>
-      </p:pic>
-      <p:pic>
-        <p:nvPicPr>
-          <p:cNvPr id="22" name="Picture 21">
-            <a:extLst>
-              <a:ext uri="{FF2B5EF4-FFF2-40B4-BE49-F238E27FC236}">
-                <a16:creationId xmlns:a16="http://schemas.microsoft.com/office/drawing/2014/main" id="{607D97AE-53A9-5B4F-BBC2-2F827910E1CE}"/>
-              </a:ext>
-            </a:extLst>
-          </p:cNvPr>
-          <p:cNvPicPr>
-            <a:picLocks noChangeAspect="1"/>
-          </p:cNvPicPr>
-          <p:nvPr/>
-        </p:nvPicPr>
-        <p:blipFill rotWithShape="1">
-          <a:blip r:embed="rId9"/>
-          <a:srcRect t="-1" b="58873"/>
-          <a:stretch/>
-        </p:blipFill>
-        <p:spPr>
-          <a:xfrm>
-            <a:off x="6664066" y="5833426"/>
-            <a:ext cx="2736252" cy="421383"/>
-          </a:xfrm>
-          <a:prstGeom prst="rect">
-            <a:avLst/>
-          </a:prstGeom>
-        </p:spPr>
-      </p:pic>
     </p:spTree>
     <p:extLst>
       <p:ext uri="{BB962C8B-B14F-4D97-AF65-F5344CB8AC3E}">
@@ -8390,7 +8605,7 @@
         <p:spPr>
           <a:xfrm>
             <a:off x="6600387" y="3955108"/>
-            <a:ext cx="1747979" cy="369332"/>
+            <a:ext cx="2388026" cy="369332"/>
           </a:xfrm>
           <a:prstGeom prst="rect">
             <a:avLst/>
@@ -8405,7 +8620,7 @@
           <a:p>
             <a:r>
               <a:rPr lang="sv-SE" dirty="0"/>
-              <a:t>4. Link is created</a:t>
+              <a:t>4. A new link is created</a:t>
             </a:r>
           </a:p>
         </p:txBody>
@@ -8780,7 +8995,7 @@
           <a:p>
             <a:r>
               <a:rPr lang="sv-SE" dirty="0"/>
-              <a:t>4. Node prefix and label is updated</a:t>
+              <a:t>4. Node predicate is updated</a:t>
             </a:r>
           </a:p>
         </p:txBody>

</xml_diff>

<commit_message>
Removed old pdf and made suggested changes
</commit_message>
<xml_diff>
--- a/EUConnect18/doc/GraphEditor introduction.pptx
+++ b/EUConnect18/doc/GraphEditor introduction.pptx
@@ -206,7 +206,7 @@
           </a:lstStyle>
           <a:p>
             <a:fld id="{EA99ECBD-0207-3547-9A52-51BCCF8FC753}" type="datetimeFigureOut">
-              <a:t>2018-10-23</a:t>
+              <a:t>2018-10-26</a:t>
             </a:fld>
             <a:endParaRPr lang="sv-SE"/>
           </a:p>
@@ -703,9 +703,8 @@
           <a:bodyPr/>
           <a:lstStyle/>
           <a:p>
-            <a:fld id="{B7C88195-5F19-4398-AC35-0F647D46A257}" type="datetimeFigureOut">
-              <a:rPr lang="sv-SE" smtClean="0"/>
-              <a:t>2018-10-23</a:t>
+            <a:fld id="{05B2475D-E576-8846-A12D-897B613D11CF}" type="datetime1">
+              <a:t>2018-10-26</a:t>
             </a:fld>
             <a:endParaRPr lang="sv-SE"/>
           </a:p>
@@ -903,9 +902,8 @@
           <a:bodyPr/>
           <a:lstStyle/>
           <a:p>
-            <a:fld id="{B7C88195-5F19-4398-AC35-0F647D46A257}" type="datetimeFigureOut">
-              <a:rPr lang="sv-SE" smtClean="0"/>
-              <a:t>2018-10-23</a:t>
+            <a:fld id="{B7D2A2B9-5E78-9145-9B37-4D52097A8EF5}" type="datetime1">
+              <a:t>2018-10-26</a:t>
             </a:fld>
             <a:endParaRPr lang="sv-SE"/>
           </a:p>
@@ -1113,9 +1111,8 @@
           <a:bodyPr/>
           <a:lstStyle/>
           <a:p>
-            <a:fld id="{B7C88195-5F19-4398-AC35-0F647D46A257}" type="datetimeFigureOut">
-              <a:rPr lang="sv-SE" smtClean="0"/>
-              <a:t>2018-10-23</a:t>
+            <a:fld id="{A7F03CEE-6F20-C244-BBD4-45D663F6DCAB}" type="datetime1">
+              <a:t>2018-10-26</a:t>
             </a:fld>
             <a:endParaRPr lang="sv-SE"/>
           </a:p>
@@ -1313,9 +1310,8 @@
           <a:bodyPr/>
           <a:lstStyle/>
           <a:p>
-            <a:fld id="{B7C88195-5F19-4398-AC35-0F647D46A257}" type="datetimeFigureOut">
-              <a:rPr lang="sv-SE" smtClean="0"/>
-              <a:t>2018-10-23</a:t>
+            <a:fld id="{5D237F6C-964F-2547-B5A5-30CB893DCEF5}" type="datetime1">
+              <a:t>2018-10-26</a:t>
             </a:fld>
             <a:endParaRPr lang="sv-SE"/>
           </a:p>
@@ -1589,9 +1585,8 @@
           <a:bodyPr/>
           <a:lstStyle/>
           <a:p>
-            <a:fld id="{B7C88195-5F19-4398-AC35-0F647D46A257}" type="datetimeFigureOut">
-              <a:rPr lang="sv-SE" smtClean="0"/>
-              <a:t>2018-10-23</a:t>
+            <a:fld id="{2B421C10-C68E-CF4C-825E-C5EE72489D5D}" type="datetime1">
+              <a:t>2018-10-26</a:t>
             </a:fld>
             <a:endParaRPr lang="sv-SE"/>
           </a:p>
@@ -1857,9 +1852,8 @@
           <a:bodyPr/>
           <a:lstStyle/>
           <a:p>
-            <a:fld id="{B7C88195-5F19-4398-AC35-0F647D46A257}" type="datetimeFigureOut">
-              <a:rPr lang="sv-SE" smtClean="0"/>
-              <a:t>2018-10-23</a:t>
+            <a:fld id="{F997BCE7-67F0-9F46-AFF1-728658727499}" type="datetime1">
+              <a:t>2018-10-26</a:t>
             </a:fld>
             <a:endParaRPr lang="sv-SE"/>
           </a:p>
@@ -2272,9 +2266,8 @@
           <a:bodyPr/>
           <a:lstStyle/>
           <a:p>
-            <a:fld id="{B7C88195-5F19-4398-AC35-0F647D46A257}" type="datetimeFigureOut">
-              <a:rPr lang="sv-SE" smtClean="0"/>
-              <a:t>2018-10-23</a:t>
+            <a:fld id="{C5E9B2E5-FF54-224C-BC64-8BDB80D97311}" type="datetime1">
+              <a:t>2018-10-26</a:t>
             </a:fld>
             <a:endParaRPr lang="sv-SE"/>
           </a:p>
@@ -2414,9 +2407,8 @@
           <a:bodyPr/>
           <a:lstStyle/>
           <a:p>
-            <a:fld id="{B7C88195-5F19-4398-AC35-0F647D46A257}" type="datetimeFigureOut">
-              <a:rPr lang="sv-SE" smtClean="0"/>
-              <a:t>2018-10-23</a:t>
+            <a:fld id="{EDF9BB46-3FD1-6F48-90F4-D9D0018C917F}" type="datetime1">
+              <a:t>2018-10-26</a:t>
             </a:fld>
             <a:endParaRPr lang="sv-SE"/>
           </a:p>
@@ -2527,9 +2519,8 @@
           <a:bodyPr/>
           <a:lstStyle/>
           <a:p>
-            <a:fld id="{B7C88195-5F19-4398-AC35-0F647D46A257}" type="datetimeFigureOut">
-              <a:rPr lang="sv-SE" smtClean="0"/>
-              <a:t>2018-10-23</a:t>
+            <a:fld id="{4CCE3BBC-6FE7-274A-AEFB-365D8E59CF4D}" type="datetime1">
+              <a:t>2018-10-26</a:t>
             </a:fld>
             <a:endParaRPr lang="sv-SE"/>
           </a:p>
@@ -2840,9 +2831,8 @@
           <a:bodyPr/>
           <a:lstStyle/>
           <a:p>
-            <a:fld id="{B7C88195-5F19-4398-AC35-0F647D46A257}" type="datetimeFigureOut">
-              <a:rPr lang="sv-SE" smtClean="0"/>
-              <a:t>2018-10-23</a:t>
+            <a:fld id="{08856E81-7C34-624E-8E17-622409526F89}" type="datetime1">
+              <a:t>2018-10-26</a:t>
             </a:fld>
             <a:endParaRPr lang="sv-SE"/>
           </a:p>
@@ -3129,9 +3119,8 @@
           <a:bodyPr/>
           <a:lstStyle/>
           <a:p>
-            <a:fld id="{B7C88195-5F19-4398-AC35-0F647D46A257}" type="datetimeFigureOut">
-              <a:rPr lang="sv-SE" smtClean="0"/>
-              <a:t>2018-10-23</a:t>
+            <a:fld id="{30B3B75C-C281-824B-BC79-EF7E60499BAC}" type="datetime1">
+              <a:t>2018-10-26</a:t>
             </a:fld>
             <a:endParaRPr lang="sv-SE"/>
           </a:p>
@@ -3372,9 +3361,8 @@
             </a:lvl1pPr>
           </a:lstStyle>
           <a:p>
-            <a:fld id="{B7C88195-5F19-4398-AC35-0F647D46A257}" type="datetimeFigureOut">
-              <a:rPr lang="sv-SE" smtClean="0"/>
-              <a:t>2018-10-23</a:t>
+            <a:fld id="{640D4866-452B-424B-850A-1D29508988DF}" type="datetime1">
+              <a:t>2018-10-26</a:t>
             </a:fld>
             <a:endParaRPr lang="sv-SE"/>
           </a:p>
@@ -3491,6 +3479,7 @@
     <p:sldLayoutId id="2147483658" r:id="rId10"/>
     <p:sldLayoutId id="2147483659" r:id="rId11"/>
   </p:sldLayoutIdLst>
+  <p:hf hdr="0" ftr="0" dt="0"/>
   <p:txStyles>
     <p:titleStyle>
       <a:lvl1pPr algn="l" defTabSz="914400" rtl="0" eaLnBrk="1" latinLnBrk="0" hangingPunct="1">
@@ -3847,6 +3836,35 @@
           </a:p>
         </p:txBody>
       </p:sp>
+      <p:sp>
+        <p:nvSpPr>
+          <p:cNvPr id="4" name="Slide Number Placeholder 3">
+            <a:extLst>
+              <a:ext uri="{FF2B5EF4-FFF2-40B4-BE49-F238E27FC236}">
+                <a16:creationId xmlns:a16="http://schemas.microsoft.com/office/drawing/2014/main" id="{7BA7B711-5A1B-2E49-888E-F6E117B178A3}"/>
+              </a:ext>
+            </a:extLst>
+          </p:cNvPr>
+          <p:cNvSpPr>
+            <a:spLocks noGrp="1"/>
+          </p:cNvSpPr>
+          <p:nvPr>
+            <p:ph type="sldNum" sz="quarter" idx="12"/>
+          </p:nvPr>
+        </p:nvSpPr>
+        <p:spPr/>
+        <p:txBody>
+          <a:bodyPr/>
+          <a:lstStyle/>
+          <a:p>
+            <a:fld id="{F54FCF48-6D1B-4676-87BA-FFA2366DC361}" type="slidenum">
+              <a:rPr lang="sv-SE" smtClean="0"/>
+              <a:t>1</a:t>
+            </a:fld>
+            <a:endParaRPr lang="sv-SE"/>
+          </a:p>
+        </p:txBody>
+      </p:sp>
     </p:spTree>
     <p:extLst>
       <p:ext uri="{BB962C8B-B14F-4D97-AF65-F5344CB8AC3E}">
@@ -4268,6 +4286,133 @@
           </a:ln>
         </p:spPr>
       </p:pic>
+      <p:sp>
+        <p:nvSpPr>
+          <p:cNvPr id="6" name="Slide Number Placeholder 5">
+            <a:extLst>
+              <a:ext uri="{FF2B5EF4-FFF2-40B4-BE49-F238E27FC236}">
+                <a16:creationId xmlns:a16="http://schemas.microsoft.com/office/drawing/2014/main" id="{AC5015A4-C7D2-0E40-BAA7-6CB2F65A912D}"/>
+              </a:ext>
+            </a:extLst>
+          </p:cNvPr>
+          <p:cNvSpPr>
+            <a:spLocks noGrp="1"/>
+          </p:cNvSpPr>
+          <p:nvPr>
+            <p:ph type="sldNum" sz="quarter" idx="12"/>
+          </p:nvPr>
+        </p:nvSpPr>
+        <p:spPr/>
+        <p:txBody>
+          <a:bodyPr/>
+          <a:lstStyle/>
+          <a:p>
+            <a:fld id="{F54FCF48-6D1B-4676-87BA-FFA2366DC361}" type="slidenum">
+              <a:rPr lang="sv-SE" smtClean="0"/>
+              <a:t>10</a:t>
+            </a:fld>
+            <a:endParaRPr lang="sv-SE"/>
+          </a:p>
+        </p:txBody>
+      </p:sp>
+      <p:sp>
+        <p:nvSpPr>
+          <p:cNvPr id="7" name="TextBox 6">
+            <a:extLst>
+              <a:ext uri="{FF2B5EF4-FFF2-40B4-BE49-F238E27FC236}">
+                <a16:creationId xmlns:a16="http://schemas.microsoft.com/office/drawing/2014/main" id="{EE032EEE-6751-414C-A2A7-FA973E854551}"/>
+              </a:ext>
+            </a:extLst>
+          </p:cNvPr>
+          <p:cNvSpPr txBox="1"/>
+          <p:nvPr/>
+        </p:nvSpPr>
+        <p:spPr>
+          <a:xfrm>
+            <a:off x="1218202" y="3573220"/>
+            <a:ext cx="3012047" cy="338554"/>
+          </a:xfrm>
+          <a:prstGeom prst="rect">
+            <a:avLst/>
+          </a:prstGeom>
+          <a:noFill/>
+        </p:spPr>
+        <p:txBody>
+          <a:bodyPr wrap="square" rtlCol="0">
+            <a:spAutoFit/>
+          </a:bodyPr>
+          <a:lstStyle/>
+          <a:p>
+            <a:r>
+              <a:rPr lang="sv-SE" sz="1600"/>
+              <a:t>Wrong: </a:t>
+            </a:r>
+            <a:r>
+              <a:rPr lang="sv-SE" sz="1600" i="1"/>
+              <a:t>Study1</a:t>
+            </a:r>
+            <a:r>
+              <a:rPr lang="sv-SE" sz="1600"/>
+              <a:t> has study </a:t>
+            </a:r>
+            <a:r>
+              <a:rPr lang="sv-SE" sz="1600" i="1"/>
+              <a:t>Drug1</a:t>
+            </a:r>
+            <a:r>
+              <a:rPr lang="sv-SE" sz="1600"/>
+              <a:t> </a:t>
+            </a:r>
+          </a:p>
+        </p:txBody>
+      </p:sp>
+      <p:sp>
+        <p:nvSpPr>
+          <p:cNvPr id="15" name="TextBox 14">
+            <a:extLst>
+              <a:ext uri="{FF2B5EF4-FFF2-40B4-BE49-F238E27FC236}">
+                <a16:creationId xmlns:a16="http://schemas.microsoft.com/office/drawing/2014/main" id="{DEA60A3E-2359-CD45-87AC-32865CDBAD24}"/>
+              </a:ext>
+            </a:extLst>
+          </p:cNvPr>
+          <p:cNvSpPr txBox="1"/>
+          <p:nvPr/>
+        </p:nvSpPr>
+        <p:spPr>
+          <a:xfrm>
+            <a:off x="7580111" y="3573220"/>
+            <a:ext cx="2880419" cy="338554"/>
+          </a:xfrm>
+          <a:prstGeom prst="rect">
+            <a:avLst/>
+          </a:prstGeom>
+          <a:noFill/>
+        </p:spPr>
+        <p:txBody>
+          <a:bodyPr wrap="square" rtlCol="0">
+            <a:spAutoFit/>
+          </a:bodyPr>
+          <a:lstStyle/>
+          <a:p>
+            <a:r>
+              <a:rPr lang="sv-SE" sz="1600"/>
+              <a:t>Correct: </a:t>
+            </a:r>
+            <a:r>
+              <a:rPr lang="sv-SE" sz="1600" i="1"/>
+              <a:t>Drug1</a:t>
+            </a:r>
+            <a:r>
+              <a:rPr lang="sv-SE" sz="1600"/>
+              <a:t> has study </a:t>
+            </a:r>
+            <a:r>
+              <a:rPr lang="sv-SE" sz="1600" i="1"/>
+              <a:t>Study1</a:t>
+            </a:r>
+          </a:p>
+        </p:txBody>
+      </p:sp>
     </p:spTree>
     <p:extLst>
       <p:ext uri="{BB962C8B-B14F-4D97-AF65-F5344CB8AC3E}">
@@ -4763,6 +4908,35 @@
           </a:fontRef>
         </p:style>
       </p:cxnSp>
+      <p:sp>
+        <p:nvSpPr>
+          <p:cNvPr id="7" name="Slide Number Placeholder 6">
+            <a:extLst>
+              <a:ext uri="{FF2B5EF4-FFF2-40B4-BE49-F238E27FC236}">
+                <a16:creationId xmlns:a16="http://schemas.microsoft.com/office/drawing/2014/main" id="{9ED12578-869C-F148-B9EA-AC806A260462}"/>
+              </a:ext>
+            </a:extLst>
+          </p:cNvPr>
+          <p:cNvSpPr>
+            <a:spLocks noGrp="1"/>
+          </p:cNvSpPr>
+          <p:nvPr>
+            <p:ph type="sldNum" sz="quarter" idx="12"/>
+          </p:nvPr>
+        </p:nvSpPr>
+        <p:spPr/>
+        <p:txBody>
+          <a:bodyPr/>
+          <a:lstStyle/>
+          <a:p>
+            <a:fld id="{F54FCF48-6D1B-4676-87BA-FFA2366DC361}" type="slidenum">
+              <a:rPr lang="sv-SE" smtClean="0"/>
+              <a:t>11</a:t>
+            </a:fld>
+            <a:endParaRPr lang="sv-SE"/>
+          </a:p>
+        </p:txBody>
+      </p:sp>
     </p:spTree>
     <p:extLst>
       <p:ext uri="{BB962C8B-B14F-4D97-AF65-F5344CB8AC3E}">
@@ -4886,6 +5060,35 @@
           </a:prstGeom>
         </p:spPr>
       </p:pic>
+      <p:sp>
+        <p:nvSpPr>
+          <p:cNvPr id="3" name="Slide Number Placeholder 2">
+            <a:extLst>
+              <a:ext uri="{FF2B5EF4-FFF2-40B4-BE49-F238E27FC236}">
+                <a16:creationId xmlns:a16="http://schemas.microsoft.com/office/drawing/2014/main" id="{F502001C-98E5-0B4E-A2A7-87ADA0779BDA}"/>
+              </a:ext>
+            </a:extLst>
+          </p:cNvPr>
+          <p:cNvSpPr>
+            <a:spLocks noGrp="1"/>
+          </p:cNvSpPr>
+          <p:nvPr>
+            <p:ph type="sldNum" sz="quarter" idx="12"/>
+          </p:nvPr>
+        </p:nvSpPr>
+        <p:spPr/>
+        <p:txBody>
+          <a:bodyPr/>
+          <a:lstStyle/>
+          <a:p>
+            <a:fld id="{F54FCF48-6D1B-4676-87BA-FFA2366DC361}" type="slidenum">
+              <a:rPr lang="sv-SE" smtClean="0"/>
+              <a:t>2</a:t>
+            </a:fld>
+            <a:endParaRPr lang="sv-SE"/>
+          </a:p>
+        </p:txBody>
+      </p:sp>
     </p:spTree>
     <p:extLst>
       <p:ext uri="{BB962C8B-B14F-4D97-AF65-F5344CB8AC3E}">
@@ -5437,6 +5640,92 @@
           </a:prstGeom>
         </p:spPr>
       </p:pic>
+      <p:sp>
+        <p:nvSpPr>
+          <p:cNvPr id="5" name="Slide Number Placeholder 4">
+            <a:extLst>
+              <a:ext uri="{FF2B5EF4-FFF2-40B4-BE49-F238E27FC236}">
+                <a16:creationId xmlns:a16="http://schemas.microsoft.com/office/drawing/2014/main" id="{D7F42253-9341-3541-AE67-466A4CF5BFDE}"/>
+              </a:ext>
+            </a:extLst>
+          </p:cNvPr>
+          <p:cNvSpPr>
+            <a:spLocks noGrp="1"/>
+          </p:cNvSpPr>
+          <p:nvPr>
+            <p:ph type="sldNum" sz="quarter" idx="12"/>
+          </p:nvPr>
+        </p:nvSpPr>
+        <p:spPr/>
+        <p:txBody>
+          <a:bodyPr/>
+          <a:lstStyle/>
+          <a:p>
+            <a:fld id="{F54FCF48-6D1B-4676-87BA-FFA2366DC361}" type="slidenum">
+              <a:rPr lang="sv-SE" smtClean="0"/>
+              <a:t>3</a:t>
+            </a:fld>
+            <a:endParaRPr lang="sv-SE"/>
+          </a:p>
+        </p:txBody>
+      </p:sp>
+      <p:sp>
+        <p:nvSpPr>
+          <p:cNvPr id="16" name="Rectangle 15">
+            <a:extLst>
+              <a:ext uri="{FF2B5EF4-FFF2-40B4-BE49-F238E27FC236}">
+                <a16:creationId xmlns:a16="http://schemas.microsoft.com/office/drawing/2014/main" id="{BAF24C0A-2461-384A-8024-A5A30E237BAC}"/>
+              </a:ext>
+            </a:extLst>
+          </p:cNvPr>
+          <p:cNvSpPr/>
+          <p:nvPr/>
+        </p:nvSpPr>
+        <p:spPr>
+          <a:xfrm>
+            <a:off x="3849493" y="2552754"/>
+            <a:ext cx="1983654" cy="1517904"/>
+          </a:xfrm>
+          <a:prstGeom prst="rect">
+            <a:avLst/>
+          </a:prstGeom>
+          <a:noFill/>
+          <a:ln w="57150">
+            <a:noFill/>
+          </a:ln>
+        </p:spPr>
+        <p:style>
+          <a:lnRef idx="2">
+            <a:schemeClr val="accent1">
+              <a:shade val="50000"/>
+            </a:schemeClr>
+          </a:lnRef>
+          <a:fillRef idx="1">
+            <a:schemeClr val="accent1"/>
+          </a:fillRef>
+          <a:effectRef idx="0">
+            <a:schemeClr val="accent1"/>
+          </a:effectRef>
+          <a:fontRef idx="minor">
+            <a:schemeClr val="lt1"/>
+          </a:fontRef>
+        </p:style>
+        <p:txBody>
+          <a:bodyPr rtlCol="0" anchor="ctr"/>
+          <a:lstStyle/>
+          <a:p>
+            <a:pPr algn="ctr"/>
+            <a:r>
+              <a:rPr lang="sv-SE" dirty="0">
+                <a:solidFill>
+                  <a:schemeClr val="tx1"/>
+                </a:solidFill>
+              </a:rPr>
+              <a:t>Whiteboard</a:t>
+            </a:r>
+          </a:p>
+        </p:txBody>
+      </p:sp>
     </p:spTree>
     <p:extLst>
       <p:ext uri="{BB962C8B-B14F-4D97-AF65-F5344CB8AC3E}">
@@ -5929,6 +6218,35 @@
           </a:prstGeom>
         </p:spPr>
       </p:pic>
+      <p:sp>
+        <p:nvSpPr>
+          <p:cNvPr id="12" name="Slide Number Placeholder 11">
+            <a:extLst>
+              <a:ext uri="{FF2B5EF4-FFF2-40B4-BE49-F238E27FC236}">
+                <a16:creationId xmlns:a16="http://schemas.microsoft.com/office/drawing/2014/main" id="{4D360774-6F03-2541-ABE3-772CA3FC877B}"/>
+              </a:ext>
+            </a:extLst>
+          </p:cNvPr>
+          <p:cNvSpPr>
+            <a:spLocks noGrp="1"/>
+          </p:cNvSpPr>
+          <p:nvPr>
+            <p:ph type="sldNum" sz="quarter" idx="12"/>
+          </p:nvPr>
+        </p:nvSpPr>
+        <p:spPr/>
+        <p:txBody>
+          <a:bodyPr/>
+          <a:lstStyle/>
+          <a:p>
+            <a:fld id="{F54FCF48-6D1B-4676-87BA-FFA2366DC361}" type="slidenum">
+              <a:rPr lang="sv-SE" smtClean="0"/>
+              <a:t>4</a:t>
+            </a:fld>
+            <a:endParaRPr lang="sv-SE"/>
+          </a:p>
+        </p:txBody>
+      </p:sp>
     </p:spTree>
     <p:extLst>
       <p:ext uri="{BB962C8B-B14F-4D97-AF65-F5344CB8AC3E}">
@@ -6359,6 +6677,35 @@
           </a:prstGeom>
         </p:spPr>
       </p:pic>
+      <p:sp>
+        <p:nvSpPr>
+          <p:cNvPr id="11" name="Slide Number Placeholder 10">
+            <a:extLst>
+              <a:ext uri="{FF2B5EF4-FFF2-40B4-BE49-F238E27FC236}">
+                <a16:creationId xmlns:a16="http://schemas.microsoft.com/office/drawing/2014/main" id="{C2ADE44E-1797-2648-9B62-E7F17FA6A92F}"/>
+              </a:ext>
+            </a:extLst>
+          </p:cNvPr>
+          <p:cNvSpPr>
+            <a:spLocks noGrp="1"/>
+          </p:cNvSpPr>
+          <p:nvPr>
+            <p:ph type="sldNum" sz="quarter" idx="12"/>
+          </p:nvPr>
+        </p:nvSpPr>
+        <p:spPr/>
+        <p:txBody>
+          <a:bodyPr/>
+          <a:lstStyle/>
+          <a:p>
+            <a:fld id="{F54FCF48-6D1B-4676-87BA-FFA2366DC361}" type="slidenum">
+              <a:rPr lang="sv-SE" smtClean="0"/>
+              <a:t>5</a:t>
+            </a:fld>
+            <a:endParaRPr lang="sv-SE"/>
+          </a:p>
+        </p:txBody>
+      </p:sp>
     </p:spTree>
     <p:extLst>
       <p:ext uri="{BB962C8B-B14F-4D97-AF65-F5344CB8AC3E}">
@@ -7226,6 +7573,35 @@
                 <a:schemeClr val="tx1"/>
               </a:solidFill>
             </a:endParaRPr>
+          </a:p>
+        </p:txBody>
+      </p:sp>
+      <p:sp>
+        <p:nvSpPr>
+          <p:cNvPr id="6" name="Slide Number Placeholder 5">
+            <a:extLst>
+              <a:ext uri="{FF2B5EF4-FFF2-40B4-BE49-F238E27FC236}">
+                <a16:creationId xmlns:a16="http://schemas.microsoft.com/office/drawing/2014/main" id="{FFCCE446-5712-1648-8FC3-64F9AB4CE903}"/>
+              </a:ext>
+            </a:extLst>
+          </p:cNvPr>
+          <p:cNvSpPr>
+            <a:spLocks noGrp="1"/>
+          </p:cNvSpPr>
+          <p:nvPr>
+            <p:ph type="sldNum" sz="quarter" idx="12"/>
+          </p:nvPr>
+        </p:nvSpPr>
+        <p:spPr/>
+        <p:txBody>
+          <a:bodyPr/>
+          <a:lstStyle/>
+          <a:p>
+            <a:fld id="{F54FCF48-6D1B-4676-87BA-FFA2366DC361}" type="slidenum">
+              <a:rPr lang="sv-SE" smtClean="0"/>
+              <a:t>6</a:t>
+            </a:fld>
+            <a:endParaRPr lang="sv-SE"/>
           </a:p>
         </p:txBody>
       </p:sp>
@@ -8045,6 +8421,35 @@
           </a:p>
         </p:txBody>
       </p:sp>
+      <p:sp>
+        <p:nvSpPr>
+          <p:cNvPr id="5" name="Slide Number Placeholder 4">
+            <a:extLst>
+              <a:ext uri="{FF2B5EF4-FFF2-40B4-BE49-F238E27FC236}">
+                <a16:creationId xmlns:a16="http://schemas.microsoft.com/office/drawing/2014/main" id="{406DB03C-CE2D-5846-9515-57E86B994A91}"/>
+              </a:ext>
+            </a:extLst>
+          </p:cNvPr>
+          <p:cNvSpPr>
+            <a:spLocks noGrp="1"/>
+          </p:cNvSpPr>
+          <p:nvPr>
+            <p:ph type="sldNum" sz="quarter" idx="12"/>
+          </p:nvPr>
+        </p:nvSpPr>
+        <p:spPr/>
+        <p:txBody>
+          <a:bodyPr/>
+          <a:lstStyle/>
+          <a:p>
+            <a:fld id="{F54FCF48-6D1B-4676-87BA-FFA2366DC361}" type="slidenum">
+              <a:rPr lang="sv-SE" smtClean="0"/>
+              <a:t>7</a:t>
+            </a:fld>
+            <a:endParaRPr lang="sv-SE"/>
+          </a:p>
+        </p:txBody>
+      </p:sp>
     </p:spTree>
     <p:extLst>
       <p:ext uri="{BB962C8B-B14F-4D97-AF65-F5344CB8AC3E}">
@@ -8625,6 +9030,35 @@
           </a:p>
         </p:txBody>
       </p:sp>
+      <p:sp>
+        <p:nvSpPr>
+          <p:cNvPr id="3" name="Slide Number Placeholder 2">
+            <a:extLst>
+              <a:ext uri="{FF2B5EF4-FFF2-40B4-BE49-F238E27FC236}">
+                <a16:creationId xmlns:a16="http://schemas.microsoft.com/office/drawing/2014/main" id="{1CA2C7D9-5740-2146-9CE3-2BC0EAAF952F}"/>
+              </a:ext>
+            </a:extLst>
+          </p:cNvPr>
+          <p:cNvSpPr>
+            <a:spLocks noGrp="1"/>
+          </p:cNvSpPr>
+          <p:nvPr>
+            <p:ph type="sldNum" sz="quarter" idx="12"/>
+          </p:nvPr>
+        </p:nvSpPr>
+        <p:spPr/>
+        <p:txBody>
+          <a:bodyPr/>
+          <a:lstStyle/>
+          <a:p>
+            <a:fld id="{F54FCF48-6D1B-4676-87BA-FFA2366DC361}" type="slidenum">
+              <a:rPr lang="sv-SE" smtClean="0"/>
+              <a:t>8</a:t>
+            </a:fld>
+            <a:endParaRPr lang="sv-SE"/>
+          </a:p>
+        </p:txBody>
+      </p:sp>
     </p:spTree>
     <p:extLst>
       <p:ext uri="{BB962C8B-B14F-4D97-AF65-F5344CB8AC3E}">
@@ -8655,93 +9089,12 @@
           <a:chExt cx="0" cy="0"/>
         </a:xfrm>
       </p:grpSpPr>
-      <p:sp>
-        <p:nvSpPr>
-          <p:cNvPr id="20" name="TextBox 19">
-            <a:extLst>
-              <a:ext uri="{FF2B5EF4-FFF2-40B4-BE49-F238E27FC236}">
-                <a16:creationId xmlns:a16="http://schemas.microsoft.com/office/drawing/2014/main" id="{7E541E24-A291-44A7-9548-A07F91505CED}"/>
-              </a:ext>
-            </a:extLst>
-          </p:cNvPr>
-          <p:cNvSpPr txBox="1"/>
-          <p:nvPr/>
-        </p:nvSpPr>
-        <p:spPr>
-          <a:xfrm>
-            <a:off x="838200" y="3997384"/>
-            <a:ext cx="5331372" cy="1754326"/>
-          </a:xfrm>
-          <a:prstGeom prst="rect">
-            <a:avLst/>
-          </a:prstGeom>
-          <a:noFill/>
-        </p:spPr>
-        <p:txBody>
-          <a:bodyPr wrap="square" rtlCol="0">
-            <a:spAutoFit/>
-          </a:bodyPr>
-          <a:lstStyle/>
-          <a:p>
-            <a:r>
-              <a:rPr lang="sv-SE" dirty="0"/>
-              <a:t>3. In edit area:</a:t>
-            </a:r>
-          </a:p>
-          <a:p>
-            <a:pPr marL="285750" indent="-285750">
-              <a:buFontTx/>
-              <a:buChar char="-"/>
-            </a:pPr>
-            <a:r>
-              <a:rPr lang="sv-SE" dirty="0"/>
-              <a:t>Select </a:t>
-            </a:r>
-            <a:r>
-              <a:rPr lang="sv-SE" i="1" dirty="0"/>
-              <a:t>Predicate </a:t>
-            </a:r>
-            <a:r>
-              <a:rPr lang="sv-SE" dirty="0"/>
-              <a:t>in the </a:t>
-            </a:r>
-            <a:br>
-              <a:rPr lang="sv-SE" dirty="0"/>
-            </a:br>
-            <a:r>
-              <a:rPr lang="sv-SE" dirty="0"/>
-              <a:t>dropdown list</a:t>
-            </a:r>
-            <a:endParaRPr lang="sv-SE" i="1" dirty="0"/>
-          </a:p>
-          <a:p>
-            <a:endParaRPr lang="sv-SE" dirty="0"/>
-          </a:p>
-          <a:p>
-            <a:endParaRPr lang="sv-SE" dirty="0"/>
-          </a:p>
-          <a:p>
-            <a:r>
-              <a:rPr lang="sv-SE" dirty="0"/>
-              <a:t>Click </a:t>
-            </a:r>
-            <a:r>
-              <a:rPr lang="sv-SE" i="1" dirty="0"/>
-              <a:t>Update/Hide</a:t>
-            </a:r>
-            <a:r>
-              <a:rPr lang="sv-SE" dirty="0"/>
-              <a:t> to save changes</a:t>
-            </a:r>
-          </a:p>
-        </p:txBody>
-      </p:sp>
       <p:pic>
         <p:nvPicPr>
-          <p:cNvPr id="19" name="Picture 18">
-            <a:extLst>
-              <a:ext uri="{FF2B5EF4-FFF2-40B4-BE49-F238E27FC236}">
-                <a16:creationId xmlns:a16="http://schemas.microsoft.com/office/drawing/2014/main" id="{5961409A-5020-422F-AD2D-F6924B2A0FD6}"/>
+          <p:cNvPr id="15" name="Picture 14">
+            <a:extLst>
+              <a:ext uri="{FF2B5EF4-FFF2-40B4-BE49-F238E27FC236}">
+                <a16:creationId xmlns:a16="http://schemas.microsoft.com/office/drawing/2014/main" id="{D520E1C6-C1C2-EC48-A1CB-68F8FA4D6C2B}"/>
               </a:ext>
             </a:extLst>
           </p:cNvPr>
@@ -8758,8 +9111,8 @@
         </p:blipFill>
         <p:spPr>
           <a:xfrm>
-            <a:off x="1589987" y="1759677"/>
-            <a:ext cx="2762250" cy="1752600"/>
+            <a:off x="3894894" y="4136696"/>
+            <a:ext cx="2032382" cy="1173629"/>
           </a:xfrm>
           <a:prstGeom prst="rect">
             <a:avLst/>
@@ -8771,6 +9124,122 @@
           </a:ln>
         </p:spPr>
       </p:pic>
+      <p:pic>
+        <p:nvPicPr>
+          <p:cNvPr id="6" name="Picture 5">
+            <a:extLst>
+              <a:ext uri="{FF2B5EF4-FFF2-40B4-BE49-F238E27FC236}">
+                <a16:creationId xmlns:a16="http://schemas.microsoft.com/office/drawing/2014/main" id="{CBA1F862-C32F-0043-9ECF-379D017A7E55}"/>
+              </a:ext>
+            </a:extLst>
+          </p:cNvPr>
+          <p:cNvPicPr>
+            <a:picLocks noChangeAspect="1"/>
+          </p:cNvPicPr>
+          <p:nvPr/>
+        </p:nvPicPr>
+        <p:blipFill>
+          <a:blip r:embed="rId3"/>
+          <a:stretch>
+            <a:fillRect/>
+          </a:stretch>
+        </p:blipFill>
+        <p:spPr>
+          <a:xfrm>
+            <a:off x="1540199" y="1776001"/>
+            <a:ext cx="2754000" cy="1761178"/>
+          </a:xfrm>
+          <a:prstGeom prst="rect">
+            <a:avLst/>
+          </a:prstGeom>
+          <a:ln>
+            <a:solidFill>
+              <a:schemeClr val="tx1"/>
+            </a:solidFill>
+          </a:ln>
+        </p:spPr>
+      </p:pic>
+      <p:sp>
+        <p:nvSpPr>
+          <p:cNvPr id="20" name="TextBox 19">
+            <a:extLst>
+              <a:ext uri="{FF2B5EF4-FFF2-40B4-BE49-F238E27FC236}">
+                <a16:creationId xmlns:a16="http://schemas.microsoft.com/office/drawing/2014/main" id="{7E541E24-A291-44A7-9548-A07F91505CED}"/>
+              </a:ext>
+            </a:extLst>
+          </p:cNvPr>
+          <p:cNvSpPr txBox="1"/>
+          <p:nvPr/>
+        </p:nvSpPr>
+        <p:spPr>
+          <a:xfrm>
+            <a:off x="838200" y="3997384"/>
+            <a:ext cx="5331372" cy="1754326"/>
+          </a:xfrm>
+          <a:prstGeom prst="rect">
+            <a:avLst/>
+          </a:prstGeom>
+          <a:noFill/>
+        </p:spPr>
+        <p:txBody>
+          <a:bodyPr wrap="square" rtlCol="0">
+            <a:spAutoFit/>
+          </a:bodyPr>
+          <a:lstStyle/>
+          <a:p>
+            <a:r>
+              <a:rPr lang="sv-SE" dirty="0"/>
+              <a:t>3. In edit area:</a:t>
+            </a:r>
+          </a:p>
+          <a:p>
+            <a:pPr marL="285750" indent="-285750">
+              <a:buFontTx/>
+              <a:buChar char="-"/>
+            </a:pPr>
+            <a:r>
+              <a:rPr lang="sv-SE" dirty="0"/>
+              <a:t>Select a </a:t>
+            </a:r>
+            <a:r>
+              <a:rPr lang="sv-SE" i="1" dirty="0"/>
+              <a:t>Predicate </a:t>
+            </a:r>
+            <a:r>
+              <a:rPr lang="sv-SE" dirty="0"/>
+              <a:t>in the </a:t>
+            </a:r>
+            <a:br>
+              <a:rPr lang="sv-SE" dirty="0"/>
+            </a:br>
+            <a:r>
+              <a:rPr lang="sv-SE" dirty="0"/>
+              <a:t>dropdown list</a:t>
+            </a:r>
+            <a:endParaRPr lang="sv-SE" i="1" dirty="0"/>
+          </a:p>
+          <a:p>
+            <a:endParaRPr lang="sv-SE" dirty="0"/>
+          </a:p>
+          <a:p>
+            <a:endParaRPr lang="sv-SE" dirty="0"/>
+          </a:p>
+          <a:p>
+            <a:r>
+              <a:rPr lang="sv-SE" dirty="0"/>
+              <a:t>Click </a:t>
+            </a:r>
+            <a:r>
+              <a:rPr lang="sv-SE" i="1" dirty="0"/>
+              <a:t>Update/Hide</a:t>
+            </a:r>
+            <a:r>
+              <a:rPr lang="sv-SE" dirty="0"/>
+              <a:t> to save changes</a:t>
+            </a:r>
+          </a:p>
+        </p:txBody>
+      </p:sp>
       <p:sp>
         <p:nvSpPr>
           <p:cNvPr id="2" name="Title 1">
@@ -8820,7 +9289,7 @@
         </p:nvCxnSpPr>
         <p:spPr>
           <a:xfrm flipH="1">
-            <a:off x="3017587" y="2635977"/>
+            <a:off x="3153055" y="2635977"/>
             <a:ext cx="471340" cy="0"/>
           </a:xfrm>
           <a:prstGeom prst="straightConnector1">
@@ -8862,7 +9331,7 @@
         </p:nvSpPr>
         <p:spPr>
           <a:xfrm>
-            <a:off x="3549682" y="2513057"/>
+            <a:off x="3685150" y="2513057"/>
             <a:ext cx="999062" cy="245839"/>
           </a:xfrm>
           <a:prstGeom prst="roundRect">
@@ -9000,111 +9469,6 @@
           </a:p>
         </p:txBody>
       </p:sp>
-      <p:pic>
-        <p:nvPicPr>
-          <p:cNvPr id="3" name="Picture 2">
-            <a:extLst>
-              <a:ext uri="{FF2B5EF4-FFF2-40B4-BE49-F238E27FC236}">
-                <a16:creationId xmlns:a16="http://schemas.microsoft.com/office/drawing/2014/main" id="{E2CB51E2-47B4-47B6-A595-C2CF8CCA41F4}"/>
-              </a:ext>
-            </a:extLst>
-          </p:cNvPr>
-          <p:cNvPicPr>
-            <a:picLocks noChangeAspect="1"/>
-          </p:cNvPicPr>
-          <p:nvPr/>
-        </p:nvPicPr>
-        <p:blipFill>
-          <a:blip r:embed="rId3"/>
-          <a:stretch>
-            <a:fillRect/>
-          </a:stretch>
-        </p:blipFill>
-        <p:spPr>
-          <a:xfrm>
-            <a:off x="7116401" y="1769202"/>
-            <a:ext cx="2733675" cy="1733550"/>
-          </a:xfrm>
-          <a:prstGeom prst="rect">
-            <a:avLst/>
-          </a:prstGeom>
-          <a:ln>
-            <a:solidFill>
-              <a:schemeClr val="tx1"/>
-            </a:solidFill>
-          </a:ln>
-        </p:spPr>
-      </p:pic>
-      <p:pic>
-        <p:nvPicPr>
-          <p:cNvPr id="9" name="Picture 8">
-            <a:extLst>
-              <a:ext uri="{FF2B5EF4-FFF2-40B4-BE49-F238E27FC236}">
-                <a16:creationId xmlns:a16="http://schemas.microsoft.com/office/drawing/2014/main" id="{CF235D58-354E-4156-81B6-F6001C33D82D}"/>
-              </a:ext>
-            </a:extLst>
-          </p:cNvPr>
-          <p:cNvPicPr>
-            <a:picLocks noChangeAspect="1"/>
-          </p:cNvPicPr>
-          <p:nvPr/>
-        </p:nvPicPr>
-        <p:blipFill>
-          <a:blip r:embed="rId4"/>
-          <a:stretch>
-            <a:fillRect/>
-          </a:stretch>
-        </p:blipFill>
-        <p:spPr>
-          <a:xfrm>
-            <a:off x="7077715" y="4215810"/>
-            <a:ext cx="2743200" cy="1752600"/>
-          </a:xfrm>
-          <a:prstGeom prst="rect">
-            <a:avLst/>
-          </a:prstGeom>
-          <a:ln>
-            <a:solidFill>
-              <a:schemeClr val="tx1"/>
-            </a:solidFill>
-          </a:ln>
-        </p:spPr>
-      </p:pic>
-      <p:pic>
-        <p:nvPicPr>
-          <p:cNvPr id="4" name="Picture 3">
-            <a:extLst>
-              <a:ext uri="{FF2B5EF4-FFF2-40B4-BE49-F238E27FC236}">
-                <a16:creationId xmlns:a16="http://schemas.microsoft.com/office/drawing/2014/main" id="{AAB79183-BD97-9C4B-8A08-78E3E3A1765C}"/>
-              </a:ext>
-            </a:extLst>
-          </p:cNvPr>
-          <p:cNvPicPr>
-            <a:picLocks noChangeAspect="1"/>
-          </p:cNvPicPr>
-          <p:nvPr/>
-        </p:nvPicPr>
-        <p:blipFill>
-          <a:blip r:embed="rId5"/>
-          <a:stretch>
-            <a:fillRect/>
-          </a:stretch>
-        </p:blipFill>
-        <p:spPr>
-          <a:xfrm>
-            <a:off x="4352237" y="4055321"/>
-            <a:ext cx="1969059" cy="1726179"/>
-          </a:xfrm>
-          <a:prstGeom prst="rect">
-            <a:avLst/>
-          </a:prstGeom>
-          <a:ln>
-            <a:solidFill>
-              <a:schemeClr val="tx1"/>
-            </a:solidFill>
-          </a:ln>
-        </p:spPr>
-      </p:pic>
       <p:sp>
         <p:nvSpPr>
           <p:cNvPr id="29" name="Rectangle 28">
@@ -9119,8 +9483,8 @@
         </p:nvSpPr>
         <p:spPr>
           <a:xfrm>
-            <a:off x="4405159" y="4693107"/>
-            <a:ext cx="650893" cy="173699"/>
+            <a:off x="3906999" y="4960104"/>
+            <a:ext cx="787580" cy="173699"/>
           </a:xfrm>
           <a:prstGeom prst="rect">
             <a:avLst/>
@@ -9161,12 +9525,41 @@
           </a:p>
         </p:txBody>
       </p:sp>
+      <p:sp>
+        <p:nvSpPr>
+          <p:cNvPr id="5" name="Slide Number Placeholder 4">
+            <a:extLst>
+              <a:ext uri="{FF2B5EF4-FFF2-40B4-BE49-F238E27FC236}">
+                <a16:creationId xmlns:a16="http://schemas.microsoft.com/office/drawing/2014/main" id="{9C169553-5005-C848-AAFC-721D2265EFB9}"/>
+              </a:ext>
+            </a:extLst>
+          </p:cNvPr>
+          <p:cNvSpPr>
+            <a:spLocks noGrp="1"/>
+          </p:cNvSpPr>
+          <p:nvPr>
+            <p:ph type="sldNum" sz="quarter" idx="12"/>
+          </p:nvPr>
+        </p:nvSpPr>
+        <p:spPr/>
+        <p:txBody>
+          <a:bodyPr/>
+          <a:lstStyle/>
+          <a:p>
+            <a:fld id="{F54FCF48-6D1B-4676-87BA-FFA2366DC361}" type="slidenum">
+              <a:rPr lang="sv-SE" smtClean="0"/>
+              <a:t>9</a:t>
+            </a:fld>
+            <a:endParaRPr lang="sv-SE"/>
+          </a:p>
+        </p:txBody>
+      </p:sp>
       <p:pic>
         <p:nvPicPr>
-          <p:cNvPr id="8" name="Picture 7">
-            <a:extLst>
-              <a:ext uri="{FF2B5EF4-FFF2-40B4-BE49-F238E27FC236}">
-                <a16:creationId xmlns:a16="http://schemas.microsoft.com/office/drawing/2014/main" id="{59691DC4-F1EA-9341-BE91-764482975513}"/>
+          <p:cNvPr id="12" name="Picture 11">
+            <a:extLst>
+              <a:ext uri="{FF2B5EF4-FFF2-40B4-BE49-F238E27FC236}">
+                <a16:creationId xmlns:a16="http://schemas.microsoft.com/office/drawing/2014/main" id="{C32D9111-BCD8-FE46-AC4B-50E3295E75BA}"/>
               </a:ext>
             </a:extLst>
           </p:cNvPr>
@@ -9176,27 +9569,32 @@
           <p:nvPr/>
         </p:nvPicPr>
         <p:blipFill>
-          <a:blip r:embed="rId6"/>
+          <a:blip r:embed="rId4"/>
           <a:stretch>
             <a:fillRect/>
           </a:stretch>
         </p:blipFill>
         <p:spPr>
           <a:xfrm>
-            <a:off x="8031491" y="4745140"/>
-            <a:ext cx="824055" cy="693941"/>
-          </a:xfrm>
-          <a:prstGeom prst="rect">
-            <a:avLst/>
-          </a:prstGeom>
+            <a:off x="6951544" y="1776001"/>
+            <a:ext cx="2775014" cy="1760400"/>
+          </a:xfrm>
+          <a:prstGeom prst="rect">
+            <a:avLst/>
+          </a:prstGeom>
+          <a:ln>
+            <a:solidFill>
+              <a:schemeClr val="tx1"/>
+            </a:solidFill>
+          </a:ln>
         </p:spPr>
       </p:pic>
       <p:pic>
         <p:nvPicPr>
-          <p:cNvPr id="11" name="Picture 10">
-            <a:extLst>
-              <a:ext uri="{FF2B5EF4-FFF2-40B4-BE49-F238E27FC236}">
-                <a16:creationId xmlns:a16="http://schemas.microsoft.com/office/drawing/2014/main" id="{E33FE80C-054C-1145-B421-3C75DAC19255}"/>
+          <p:cNvPr id="16" name="Picture 15">
+            <a:extLst>
+              <a:ext uri="{FF2B5EF4-FFF2-40B4-BE49-F238E27FC236}">
+                <a16:creationId xmlns:a16="http://schemas.microsoft.com/office/drawing/2014/main" id="{E0A0CE7F-09B2-1C41-B01D-F261A201A227}"/>
               </a:ext>
             </a:extLst>
           </p:cNvPr>
@@ -9206,19 +9604,24 @@
           <p:nvPr/>
         </p:nvPicPr>
         <p:blipFill>
-          <a:blip r:embed="rId7"/>
+          <a:blip r:embed="rId5"/>
           <a:stretch>
             <a:fillRect/>
           </a:stretch>
         </p:blipFill>
         <p:spPr>
           <a:xfrm>
-            <a:off x="4957822" y="4390239"/>
-            <a:ext cx="1214398" cy="182160"/>
-          </a:xfrm>
-          <a:prstGeom prst="rect">
-            <a:avLst/>
-          </a:prstGeom>
+            <a:off x="6951544" y="4239189"/>
+            <a:ext cx="2782800" cy="1760867"/>
+          </a:xfrm>
+          <a:prstGeom prst="rect">
+            <a:avLst/>
+          </a:prstGeom>
+          <a:ln>
+            <a:solidFill>
+              <a:schemeClr val="tx1"/>
+            </a:solidFill>
+          </a:ln>
         </p:spPr>
       </p:pic>
     </p:spTree>

</xml_diff>